<commit_message>
[intermediate] Optimization Problem Formulation
</commit_message>
<xml_diff>
--- a/02_Presentation/0201_Intermediate/Intermediate_Semesterthesis_v0.pptx
+++ b/02_Presentation/0201_Intermediate/Intermediate_Semesterthesis_v0.pptx
@@ -5,19 +5,15 @@
     <p:sldMasterId id="2147483648" r:id="rId1"/>
   </p:sldMasterIdLst>
   <p:notesMasterIdLst>
-    <p:notesMasterId r:id="rId12"/>
+    <p:notesMasterId r:id="rId8"/>
   </p:notesMasterIdLst>
   <p:sldIdLst>
-    <p:sldId id="256" r:id="rId2"/>
-    <p:sldId id="257" r:id="rId3"/>
-    <p:sldId id="258" r:id="rId4"/>
-    <p:sldId id="259" r:id="rId5"/>
-    <p:sldId id="260" r:id="rId6"/>
-    <p:sldId id="261" r:id="rId7"/>
-    <p:sldId id="262" r:id="rId8"/>
-    <p:sldId id="263" r:id="rId9"/>
-    <p:sldId id="264" r:id="rId10"/>
-    <p:sldId id="265" r:id="rId11"/>
+    <p:sldId id="259" r:id="rId2"/>
+    <p:sldId id="258" r:id="rId3"/>
+    <p:sldId id="260" r:id="rId4"/>
+    <p:sldId id="261" r:id="rId5"/>
+    <p:sldId id="262" r:id="rId6"/>
+    <p:sldId id="263" r:id="rId7"/>
   </p:sldIdLst>
   <p:sldSz cx="9144000" cy="6858000" type="screen4x3"/>
   <p:notesSz cx="7099300" cy="10234613"/>
@@ -202,7 +198,7 @@
             <a:fld id="{BCDB334D-D17F-49C4-91DD-37BB7E818209}" type="datetimeFigureOut">
               <a:rPr lang="de-CH" smtClean="0"/>
               <a:pPr/>
-              <a:t>17.04.2014</a:t>
+              <a:t>19.04.2014</a:t>
             </a:fld>
             <a:endParaRPr lang="de-CH"/>
           </a:p>
@@ -371,7 +367,7 @@
     </p:spTree>
     <p:extLst>
       <p:ext uri="{BB962C8B-B14F-4D97-AF65-F5344CB8AC3E}">
-        <p14:creationId xmlns:p14="http://schemas.microsoft.com/office/powerpoint/2010/main" xmlns="" val="277359971"/>
+        <p14:creationId xmlns="" xmlns:p14="http://schemas.microsoft.com/office/powerpoint/2010/main" val="277359971"/>
       </p:ext>
     </p:extLst>
   </p:cSld>
@@ -629,7 +625,7 @@
             <a:fld id="{92BF4FBE-0522-49A2-A01E-13F521B4C0B7}" type="datetime1">
               <a:rPr lang="de-DE" smtClean="0"/>
               <a:pPr/>
-              <a:t>17.04.2014</a:t>
+              <a:t>19.04.2014</a:t>
             </a:fld>
             <a:endParaRPr lang="de-DE"/>
           </a:p>
@@ -651,10 +647,10 @@
           <a:lstStyle/>
           <a:p>
             <a:r>
-              <a:rPr lang="de-DE" smtClean="0"/>
-              <a:t>((Vorname Nachname))</a:t>
-            </a:r>
-            <a:endParaRPr lang="de-DE"/>
+              <a:rPr lang="de-DE" dirty="0" smtClean="0"/>
+              <a:t>Matthias Krebs, Simon Laube</a:t>
+            </a:r>
+            <a:endParaRPr lang="de-DE" dirty="0"/>
           </a:p>
         </p:txBody>
       </p:sp>
@@ -694,7 +690,7 @@
           <a:blip r:embed="rId2">
             <a:extLst>
               <a:ext uri="{28A0092B-C50C-407E-A947-70E740481C1C}">
-                <a14:useLocalDpi xmlns:a14="http://schemas.microsoft.com/office/drawing/2010/main" xmlns="" val="0"/>
+                <a14:useLocalDpi xmlns="" xmlns:a14="http://schemas.microsoft.com/office/drawing/2010/main" val="0"/>
               </a:ext>
             </a:extLst>
           </a:blip>
@@ -759,7 +755,7 @@
     </p:spTree>
     <p:extLst>
       <p:ext uri="{BB962C8B-B14F-4D97-AF65-F5344CB8AC3E}">
-        <p14:creationId xmlns:p14="http://schemas.microsoft.com/office/powerpoint/2010/main" xmlns="" val="826009964"/>
+        <p14:creationId xmlns="" xmlns:p14="http://schemas.microsoft.com/office/powerpoint/2010/main" val="826009964"/>
       </p:ext>
     </p:extLst>
   </p:cSld>
@@ -856,7 +852,7 @@
             <a:fld id="{681F6098-E9E1-42B4-9C80-2F52B9453439}" type="datetime1">
               <a:rPr lang="de-DE" smtClean="0"/>
               <a:pPr/>
-              <a:t>17.04.2014</a:t>
+              <a:t>19.04.2014</a:t>
             </a:fld>
             <a:endParaRPr lang="de-DE"/>
           </a:p>
@@ -878,10 +874,10 @@
           <a:lstStyle/>
           <a:p>
             <a:r>
-              <a:rPr lang="de-DE" smtClean="0"/>
-              <a:t>((Vorname Nachname))</a:t>
-            </a:r>
-            <a:endParaRPr lang="de-DE"/>
+              <a:rPr lang="de-DE" dirty="0" smtClean="0"/>
+              <a:t>Matthias Krebs, Simon Laube</a:t>
+            </a:r>
+            <a:endParaRPr lang="de-DE" dirty="0"/>
           </a:p>
         </p:txBody>
       </p:sp>
@@ -912,7 +908,7 @@
     </p:spTree>
     <p:extLst>
       <p:ext uri="{BB962C8B-B14F-4D97-AF65-F5344CB8AC3E}">
-        <p14:creationId xmlns:p14="http://schemas.microsoft.com/office/powerpoint/2010/main" xmlns="" val="748044121"/>
+        <p14:creationId xmlns="" xmlns:p14="http://schemas.microsoft.com/office/powerpoint/2010/main" val="748044121"/>
       </p:ext>
     </p:extLst>
   </p:cSld>
@@ -1130,7 +1126,7 @@
             <a:fld id="{0E397BD4-0686-495C-8D8F-54DB8CB790DF}" type="datetime1">
               <a:rPr lang="de-DE" smtClean="0"/>
               <a:pPr/>
-              <a:t>17.04.2014</a:t>
+              <a:t>19.04.2014</a:t>
             </a:fld>
             <a:endParaRPr lang="de-DE"/>
           </a:p>
@@ -1152,10 +1148,10 @@
           <a:lstStyle/>
           <a:p>
             <a:r>
-              <a:rPr lang="de-DE" smtClean="0"/>
-              <a:t>((Vorname Nachname))</a:t>
-            </a:r>
-            <a:endParaRPr lang="de-DE"/>
+              <a:rPr lang="de-DE" dirty="0" smtClean="0"/>
+              <a:t>Matthias Krebs, Simon Laube</a:t>
+            </a:r>
+            <a:endParaRPr lang="de-DE" dirty="0"/>
           </a:p>
         </p:txBody>
       </p:sp>
@@ -1220,7 +1216,7 @@
     </p:spTree>
     <p:extLst>
       <p:ext uri="{BB962C8B-B14F-4D97-AF65-F5344CB8AC3E}">
-        <p14:creationId xmlns:p14="http://schemas.microsoft.com/office/powerpoint/2010/main" xmlns="" val="826009964"/>
+        <p14:creationId xmlns="" xmlns:p14="http://schemas.microsoft.com/office/powerpoint/2010/main" val="826009964"/>
       </p:ext>
     </p:extLst>
   </p:cSld>
@@ -1441,7 +1437,7 @@
             <a:fld id="{0E397BD4-0686-495C-8D8F-54DB8CB790DF}" type="datetime1">
               <a:rPr lang="de-DE" smtClean="0"/>
               <a:pPr/>
-              <a:t>17.04.2014</a:t>
+              <a:t>19.04.2014</a:t>
             </a:fld>
             <a:endParaRPr lang="de-DE"/>
           </a:p>
@@ -1463,10 +1459,10 @@
           <a:lstStyle/>
           <a:p>
             <a:r>
-              <a:rPr lang="de-DE" smtClean="0"/>
-              <a:t>((Vorname Nachname))</a:t>
-            </a:r>
-            <a:endParaRPr lang="de-DE"/>
+              <a:rPr lang="de-DE" dirty="0" smtClean="0"/>
+              <a:t>Matthias Krebs, Simon Laube</a:t>
+            </a:r>
+            <a:endParaRPr lang="de-DE" dirty="0"/>
           </a:p>
         </p:txBody>
       </p:sp>
@@ -1531,7 +1527,7 @@
     </p:spTree>
     <p:extLst>
       <p:ext uri="{BB962C8B-B14F-4D97-AF65-F5344CB8AC3E}">
-        <p14:creationId xmlns:p14="http://schemas.microsoft.com/office/powerpoint/2010/main" xmlns="" val="1490291718"/>
+        <p14:creationId xmlns="" xmlns:p14="http://schemas.microsoft.com/office/powerpoint/2010/main" val="1490291718"/>
       </p:ext>
     </p:extLst>
   </p:cSld>
@@ -1869,7 +1865,7 @@
             <a:blip r:embed="rId3">
               <a:extLst>
                 <a:ext uri="{28A0092B-C50C-407E-A947-70E740481C1C}">
-                  <a14:useLocalDpi xmlns:a14="http://schemas.microsoft.com/office/drawing/2010/main" xmlns="" val="0"/>
+                  <a14:useLocalDpi xmlns="" xmlns:a14="http://schemas.microsoft.com/office/drawing/2010/main" val="0"/>
                 </a:ext>
               </a:extLst>
             </a:blip>
@@ -1933,7 +1929,7 @@
     </p:spTree>
     <p:extLst>
       <p:ext uri="{BB962C8B-B14F-4D97-AF65-F5344CB8AC3E}">
-        <p14:creationId xmlns:p14="http://schemas.microsoft.com/office/powerpoint/2010/main" xmlns="" val="1980723131"/>
+        <p14:creationId xmlns="" xmlns:p14="http://schemas.microsoft.com/office/powerpoint/2010/main" val="1980723131"/>
       </p:ext>
     </p:extLst>
   </p:cSld>
@@ -2046,7 +2042,7 @@
             <a:fld id="{3B2F6CB8-9391-4BED-909F-C47A979AE1C4}" type="datetime1">
               <a:rPr lang="de-DE" smtClean="0"/>
               <a:pPr/>
-              <a:t>17.04.2014</a:t>
+              <a:t>19.04.2014</a:t>
             </a:fld>
             <a:endParaRPr lang="de-DE"/>
           </a:p>
@@ -2068,10 +2064,10 @@
           <a:lstStyle/>
           <a:p>
             <a:r>
-              <a:rPr lang="de-DE" smtClean="0"/>
-              <a:t>((Vorname Nachname))</a:t>
-            </a:r>
-            <a:endParaRPr lang="de-DE"/>
+              <a:rPr lang="de-DE" dirty="0" smtClean="0"/>
+              <a:t>Matthias Krebs, Simon Laube</a:t>
+            </a:r>
+            <a:endParaRPr lang="de-DE" dirty="0"/>
           </a:p>
         </p:txBody>
       </p:sp>
@@ -2381,7 +2377,7 @@
             <a:fld id="{C6A1628A-2A40-4B37-B167-309C0EBB4BBF}" type="datetime1">
               <a:rPr lang="de-DE" smtClean="0"/>
               <a:pPr/>
-              <a:t>17.04.2014</a:t>
+              <a:t>19.04.2014</a:t>
             </a:fld>
             <a:endParaRPr lang="de-DE"/>
           </a:p>
@@ -2403,10 +2399,10 @@
           <a:lstStyle/>
           <a:p>
             <a:r>
-              <a:rPr lang="de-DE" smtClean="0"/>
-              <a:t>((Vorname Nachname))</a:t>
-            </a:r>
-            <a:endParaRPr lang="de-DE"/>
+              <a:rPr lang="de-DE" dirty="0" smtClean="0"/>
+              <a:t>Matthias Krebs, Simon Laube</a:t>
+            </a:r>
+            <a:endParaRPr lang="de-DE" dirty="0"/>
           </a:p>
         </p:txBody>
       </p:sp>
@@ -2507,7 +2503,7 @@
             <a:fld id="{64AE1E89-2EE0-4320-B5A2-F15E505D5862}" type="datetime1">
               <a:rPr lang="de-DE" smtClean="0"/>
               <a:pPr/>
-              <a:t>17.04.2014</a:t>
+              <a:t>19.04.2014</a:t>
             </a:fld>
             <a:endParaRPr lang="de-DE"/>
           </a:p>
@@ -2529,10 +2525,10 @@
           <a:lstStyle/>
           <a:p>
             <a:r>
-              <a:rPr lang="de-DE" smtClean="0"/>
-              <a:t>((Vorname Nachname))</a:t>
-            </a:r>
-            <a:endParaRPr lang="de-DE"/>
+              <a:rPr lang="de-DE" dirty="0" smtClean="0"/>
+              <a:t>Matthias Krebs, Simon Laube</a:t>
+            </a:r>
+            <a:endParaRPr lang="de-DE" dirty="0"/>
           </a:p>
         </p:txBody>
       </p:sp>
@@ -2636,7 +2632,7 @@
             <a:fld id="{7D860B62-60FD-48EF-B2F4-6E7265AD3459}" type="datetime1">
               <a:rPr lang="de-DE" smtClean="0"/>
               <a:pPr/>
-              <a:t>17.04.2014</a:t>
+              <a:t>19.04.2014</a:t>
             </a:fld>
             <a:endParaRPr lang="de-DE"/>
           </a:p>
@@ -2658,10 +2654,10 @@
           <a:lstStyle/>
           <a:p>
             <a:r>
-              <a:rPr lang="de-DE" smtClean="0"/>
-              <a:t>((Vorname Nachname))</a:t>
-            </a:r>
-            <a:endParaRPr lang="de-DE"/>
+              <a:rPr lang="de-DE" dirty="0" smtClean="0"/>
+              <a:t>Matthias Krebs, Simon Laube</a:t>
+            </a:r>
+            <a:endParaRPr lang="de-DE" dirty="0"/>
           </a:p>
         </p:txBody>
       </p:sp>
@@ -2726,7 +2722,7 @@
     </p:spTree>
     <p:extLst>
       <p:ext uri="{BB962C8B-B14F-4D97-AF65-F5344CB8AC3E}">
-        <p14:creationId xmlns:p14="http://schemas.microsoft.com/office/powerpoint/2010/main" xmlns="" val="1353896245"/>
+        <p14:creationId xmlns="" xmlns:p14="http://schemas.microsoft.com/office/powerpoint/2010/main" val="1353896245"/>
       </p:ext>
     </p:extLst>
   </p:cSld>
@@ -2781,7 +2777,7 @@
             <a:fld id="{7F4A91D9-FBFE-4ACC-A99A-BC74A6E03CC5}" type="datetime1">
               <a:rPr lang="de-DE" smtClean="0"/>
               <a:pPr/>
-              <a:t>17.04.2014</a:t>
+              <a:t>19.04.2014</a:t>
             </a:fld>
             <a:endParaRPr lang="de-DE"/>
           </a:p>
@@ -2803,10 +2799,10 @@
           <a:lstStyle/>
           <a:p>
             <a:r>
-              <a:rPr lang="de-DE" smtClean="0"/>
-              <a:t>((Vorname Nachname))</a:t>
-            </a:r>
-            <a:endParaRPr lang="de-DE"/>
+              <a:rPr lang="de-DE" dirty="0" smtClean="0"/>
+              <a:t>Matthias Krebs, Simon Laube</a:t>
+            </a:r>
+            <a:endParaRPr lang="de-DE" dirty="0"/>
           </a:p>
         </p:txBody>
       </p:sp>
@@ -2922,7 +2918,7 @@
     </p:spTree>
     <p:extLst>
       <p:ext uri="{BB962C8B-B14F-4D97-AF65-F5344CB8AC3E}">
-        <p14:creationId xmlns:p14="http://schemas.microsoft.com/office/powerpoint/2010/main" xmlns="" val="3262962747"/>
+        <p14:creationId xmlns="" xmlns:p14="http://schemas.microsoft.com/office/powerpoint/2010/main" val="3262962747"/>
       </p:ext>
     </p:extLst>
   </p:cSld>
@@ -3125,7 +3121,7 @@
             <a:blip r:embed="rId12">
               <a:extLst>
                 <a:ext uri="{28A0092B-C50C-407E-A947-70E740481C1C}">
-                  <a14:useLocalDpi xmlns:a14="http://schemas.microsoft.com/office/drawing/2010/main" xmlns="" val="0"/>
+                  <a14:useLocalDpi xmlns="" xmlns:a14="http://schemas.microsoft.com/office/drawing/2010/main" val="0"/>
                 </a:ext>
               </a:extLst>
             </a:blip>
@@ -3179,7 +3175,7 @@
             <a:fld id="{BD23B19E-8C35-419D-B8B2-87612A89E43F}" type="datetime1">
               <a:rPr lang="de-DE" smtClean="0"/>
               <a:pPr/>
-              <a:t>17.04.2014</a:t>
+              <a:t>19.04.2014</a:t>
             </a:fld>
             <a:endParaRPr lang="de-DE" dirty="0"/>
           </a:p>
@@ -3218,7 +3214,7 @@
           <a:p>
             <a:r>
               <a:rPr lang="de-DE" dirty="0" smtClean="0"/>
-              <a:t>((Vorname Nachname))</a:t>
+              <a:t>Matthias Krebs, Simon Laube</a:t>
             </a:r>
             <a:endParaRPr lang="de-DE" dirty="0"/>
           </a:p>
@@ -3470,7 +3466,7 @@
           <a:blip r:embed="rId13">
             <a:extLst>
               <a:ext uri="{28A0092B-C50C-407E-A947-70E740481C1C}">
-                <a14:useLocalDpi xmlns:a14="http://schemas.microsoft.com/office/drawing/2010/main" xmlns="" val="0"/>
+                <a14:useLocalDpi xmlns="" xmlns:a14="http://schemas.microsoft.com/office/drawing/2010/main" val="0"/>
               </a:ext>
             </a:extLst>
           </a:blip>
@@ -3819,7 +3815,7 @@
       </p:grpSpPr>
       <p:sp>
         <p:nvSpPr>
-          <p:cNvPr id="2" name="Untertitel 1"/>
+          <p:cNvPr id="9" name="Untertitel 8"/>
           <p:cNvSpPr>
             <a:spLocks noGrp="1"/>
           </p:cNvSpPr>
@@ -3834,17 +3830,19 @@
           <a:p>
             <a:r>
               <a:rPr lang="de-CH" dirty="0" smtClean="0"/>
-              <a:t>Semester Thesis</a:t>
-            </a:r>
-          </a:p>
-          <a:p>
-            <a:endParaRPr lang="de-CH" dirty="0"/>
-          </a:p>
-        </p:txBody>
-      </p:sp>
-      <p:sp>
-        <p:nvSpPr>
-          <p:cNvPr id="3" name="Datumsplatzhalter 2"/>
+              <a:t>Semester </a:t>
+            </a:r>
+            <a:r>
+              <a:rPr lang="de-CH" dirty="0" smtClean="0"/>
+              <a:t>Thesis</a:t>
+            </a:r>
+            <a:endParaRPr lang="de-CH" dirty="0" smtClean="0"/>
+          </a:p>
+        </p:txBody>
+      </p:sp>
+      <p:sp>
+        <p:nvSpPr>
+          <p:cNvPr id="4" name="Datumsplatzhalter 3"/>
           <p:cNvSpPr>
             <a:spLocks noGrp="1"/>
           </p:cNvSpPr>
@@ -3857,10 +3855,10 @@
           <a:bodyPr/>
           <a:lstStyle/>
           <a:p>
-            <a:fld id="{92BF4FBE-0522-49A2-A01E-13F521B4C0B7}" type="datetime1">
+            <a:fld id="{0E397BD4-0686-495C-8D8F-54DB8CB790DF}" type="datetime1">
               <a:rPr lang="de-DE" smtClean="0"/>
               <a:pPr/>
-              <a:t>17.04.2014</a:t>
+              <a:t>19.04.2014</a:t>
             </a:fld>
             <a:endParaRPr lang="de-DE"/>
           </a:p>
@@ -3868,7 +3866,7 @@
       </p:sp>
       <p:sp>
         <p:nvSpPr>
-          <p:cNvPr id="4" name="Fußzeilenplatzhalter 3"/>
+          <p:cNvPr id="5" name="Fußzeilenplatzhalter 4"/>
           <p:cNvSpPr>
             <a:spLocks noGrp="1"/>
           </p:cNvSpPr>
@@ -3882,8 +3880,8 @@
           <a:lstStyle/>
           <a:p>
             <a:r>
-              <a:rPr lang="de-DE" dirty="0" smtClean="0"/>
-              <a:t>((Matthias Krebs, Simon Laube))</a:t>
+              <a:rPr lang="de-DE" smtClean="0"/>
+              <a:t>Matthias Krebs, Simon Laube</a:t>
             </a:r>
             <a:endParaRPr lang="de-DE" dirty="0"/>
           </a:p>
@@ -3891,7 +3889,7 @@
       </p:sp>
       <p:sp>
         <p:nvSpPr>
-          <p:cNvPr id="5" name="Foliennummernplatzhalter 4"/>
+          <p:cNvPr id="6" name="Foliennummernplatzhalter 5"/>
           <p:cNvSpPr>
             <a:spLocks noGrp="1"/>
           </p:cNvSpPr>
@@ -3915,7 +3913,7 @@
       </p:sp>
       <p:sp>
         <p:nvSpPr>
-          <p:cNvPr id="6" name="Titel 5"/>
+          <p:cNvPr id="8" name="Titel 7"/>
           <p:cNvSpPr>
             <a:spLocks noGrp="1"/>
           </p:cNvSpPr>
@@ -3930,22 +3928,19 @@
           <a:p>
             <a:r>
               <a:rPr lang="en-US" dirty="0" smtClean="0"/>
-              <a:t>Estimation of Actuation Configuration for a Multi-Actuated Blimp</a:t>
-            </a:r>
-            <a:r>
-              <a:rPr lang="de-CH" dirty="0" smtClean="0"/>
-              <a:t/>
-            </a:r>
-            <a:br>
-              <a:rPr lang="de-CH" dirty="0" smtClean="0"/>
-            </a:br>
+              <a:t>Estimation of Actuation Configuration for a Multi-Actuated </a:t>
+            </a:r>
+            <a:r>
+              <a:rPr lang="en-US" dirty="0" smtClean="0"/>
+              <a:t>Blimp</a:t>
+            </a:r>
             <a:endParaRPr lang="de-CH" dirty="0"/>
           </a:p>
         </p:txBody>
       </p:sp>
       <p:sp>
         <p:nvSpPr>
-          <p:cNvPr id="7" name="Untertitel 1"/>
+          <p:cNvPr id="10" name="Untertitel 1"/>
           <p:cNvSpPr txBox="1">
             <a:spLocks/>
           </p:cNvSpPr>
@@ -4101,15 +4096,7 @@
                   <a:schemeClr val="bg1"/>
                 </a:solidFill>
               </a:rPr>
-              <a:t>	</a:t>
-            </a:r>
-            <a:r>
-              <a:rPr lang="de-CH" baseline="0" dirty="0" smtClean="0">
-                <a:solidFill>
-                  <a:schemeClr val="bg1"/>
-                </a:solidFill>
-              </a:rPr>
-              <a:t>	Simon</a:t>
+              <a:t>		Simon</a:t>
             </a:r>
             <a:r>
               <a:rPr lang="de-CH" dirty="0" smtClean="0">
@@ -4172,11 +4159,6 @@
         </p:txBody>
       </p:sp>
     </p:spTree>
-    <p:extLst>
-      <p:ext uri="{BB962C8B-B14F-4D97-AF65-F5344CB8AC3E}">
-        <p14:creationId xmlns:p14="http://schemas.microsoft.com/office/powerpoint/2010/main" xmlns="" val="925331975"/>
-      </p:ext>
-    </p:extLst>
   </p:cSld>
   <p:clrMapOvr>
     <a:masterClrMapping/>
@@ -4184,129 +4166,13 @@
   <p:transition>
     <p:fade/>
   </p:transition>
-</p:sld>
-</file>
-
-<file path=ppt/slides/slide10.xml><?xml version="1.0" encoding="utf-8"?>
-<p:sld xmlns:a="http://schemas.openxmlformats.org/drawingml/2006/main" xmlns:r="http://schemas.openxmlformats.org/officeDocument/2006/relationships" xmlns:p="http://schemas.openxmlformats.org/presentationml/2006/main">
-  <p:cSld>
-    <p:spTree>
-      <p:nvGrpSpPr>
-        <p:cNvPr id="1" name=""/>
-        <p:cNvGrpSpPr/>
-        <p:nvPr/>
-      </p:nvGrpSpPr>
-      <p:grpSpPr>
-        <a:xfrm>
-          <a:off x="0" y="0"/>
-          <a:ext cx="0" cy="0"/>
-          <a:chOff x="0" y="0"/>
-          <a:chExt cx="0" cy="0"/>
-        </a:xfrm>
-      </p:grpSpPr>
-      <p:sp>
-        <p:nvSpPr>
-          <p:cNvPr id="2" name="Titel 1"/>
-          <p:cNvSpPr>
-            <a:spLocks noGrp="1"/>
-          </p:cNvSpPr>
-          <p:nvPr>
-            <p:ph type="title"/>
-          </p:nvPr>
-        </p:nvSpPr>
-        <p:spPr/>
-        <p:txBody>
-          <a:bodyPr/>
-          <a:lstStyle/>
-          <a:p>
-            <a:endParaRPr lang="de-CH"/>
-          </a:p>
-        </p:txBody>
-      </p:sp>
-      <p:sp>
-        <p:nvSpPr>
-          <p:cNvPr id="3" name="Datumsplatzhalter 2"/>
-          <p:cNvSpPr>
-            <a:spLocks noGrp="1"/>
-          </p:cNvSpPr>
-          <p:nvPr>
-            <p:ph type="dt" sz="half" idx="10"/>
-          </p:nvPr>
-        </p:nvSpPr>
-        <p:spPr/>
-        <p:txBody>
-          <a:bodyPr/>
-          <a:lstStyle/>
-          <a:p>
-            <a:fld id="{681F6098-E9E1-42B4-9C80-2F52B9453439}" type="datetime1">
-              <a:rPr lang="de-DE" smtClean="0"/>
-              <a:pPr/>
-              <a:t>17.04.2014</a:t>
-            </a:fld>
-            <a:endParaRPr lang="de-DE"/>
-          </a:p>
-        </p:txBody>
-      </p:sp>
-      <p:sp>
-        <p:nvSpPr>
-          <p:cNvPr id="4" name="Fußzeilenplatzhalter 3"/>
-          <p:cNvSpPr>
-            <a:spLocks noGrp="1"/>
-          </p:cNvSpPr>
-          <p:nvPr>
-            <p:ph type="ftr" sz="quarter" idx="11"/>
-          </p:nvPr>
-        </p:nvSpPr>
-        <p:spPr/>
-        <p:txBody>
-          <a:bodyPr/>
-          <a:lstStyle/>
-          <a:p>
-            <a:r>
-              <a:rPr lang="de-DE" smtClean="0"/>
-              <a:t>((Vorname Nachname))</a:t>
-            </a:r>
-            <a:endParaRPr lang="de-DE"/>
-          </a:p>
-        </p:txBody>
-      </p:sp>
-      <p:sp>
-        <p:nvSpPr>
-          <p:cNvPr id="5" name="Foliennummernplatzhalter 4"/>
-          <p:cNvSpPr>
-            <a:spLocks noGrp="1"/>
-          </p:cNvSpPr>
-          <p:nvPr>
-            <p:ph type="sldNum" sz="quarter" idx="12"/>
-          </p:nvPr>
-        </p:nvSpPr>
-        <p:spPr/>
-        <p:txBody>
-          <a:bodyPr/>
-          <a:lstStyle/>
-          <a:p>
-            <a:fld id="{6C6AE60A-B69C-4790-82F7-3882EDF23186}" type="slidenum">
-              <a:rPr lang="de-DE" smtClean="0"/>
-              <a:pPr/>
-              <a:t>10</a:t>
-            </a:fld>
-            <a:endParaRPr lang="de-DE"/>
-          </a:p>
-        </p:txBody>
-      </p:sp>
-    </p:spTree>
-    <p:extLst>
-      <p:ext uri="{BB962C8B-B14F-4D97-AF65-F5344CB8AC3E}">
-        <p14:creationId xmlns:p14="http://schemas.microsoft.com/office/powerpoint/2010/main" xmlns="" val="299640975"/>
-      </p:ext>
-    </p:extLst>
-  </p:cSld>
-  <p:clrMapOvr>
-    <a:masterClrMapping/>
-  </p:clrMapOvr>
-  <p:transition>
-    <p:fade/>
-  </p:transition>
+  <p:timing>
+    <p:tnLst>
+      <p:par>
+        <p:cTn id="1" dur="indefinite" restart="never" nodeType="tmRoot"/>
+      </p:par>
+    </p:tnLst>
+  </p:timing>
 </p:sld>
 </file>
 
@@ -4329,12 +4195,12 @@
       </p:grpSpPr>
       <p:sp>
         <p:nvSpPr>
-          <p:cNvPr id="2" name="Titel 1"/>
-          <p:cNvSpPr>
-            <a:spLocks noGrp="1"/>
-          </p:cNvSpPr>
-          <p:nvPr>
-            <p:ph type="ctrTitle"/>
+          <p:cNvPr id="2" name="Inhaltsplatzhalter 1"/>
+          <p:cNvSpPr>
+            <a:spLocks noGrp="1"/>
+          </p:cNvSpPr>
+          <p:nvPr>
+            <p:ph idx="1"/>
           </p:nvPr>
         </p:nvSpPr>
         <p:spPr/>
@@ -4348,12 +4214,12 @@
       </p:sp>
       <p:sp>
         <p:nvSpPr>
-          <p:cNvPr id="3" name="Untertitel 2"/>
-          <p:cNvSpPr>
-            <a:spLocks noGrp="1"/>
-          </p:cNvSpPr>
-          <p:nvPr>
-            <p:ph type="subTitle" idx="1"/>
+          <p:cNvPr id="3" name="Datumsplatzhalter 2"/>
+          <p:cNvSpPr>
+            <a:spLocks noGrp="1"/>
+          </p:cNvSpPr>
+          <p:nvPr>
+            <p:ph type="dt" sz="half" idx="10"/>
           </p:nvPr>
         </p:nvSpPr>
         <p:spPr/>
@@ -4361,29 +4227,10 @@
           <a:bodyPr/>
           <a:lstStyle/>
           <a:p>
-            <a:endParaRPr lang="de-CH"/>
-          </a:p>
-        </p:txBody>
-      </p:sp>
-      <p:sp>
-        <p:nvSpPr>
-          <p:cNvPr id="4" name="Datumsplatzhalter 3"/>
-          <p:cNvSpPr>
-            <a:spLocks noGrp="1"/>
-          </p:cNvSpPr>
-          <p:nvPr>
-            <p:ph type="dt" sz="half" idx="10"/>
-          </p:nvPr>
-        </p:nvSpPr>
-        <p:spPr/>
-        <p:txBody>
-          <a:bodyPr/>
-          <a:lstStyle/>
-          <a:p>
-            <a:fld id="{0E397BD4-0686-495C-8D8F-54DB8CB790DF}" type="datetime1">
+            <a:fld id="{3B2F6CB8-9391-4BED-909F-C47A979AE1C4}" type="datetime1">
               <a:rPr lang="de-DE" smtClean="0"/>
               <a:pPr/>
-              <a:t>17.04.2014</a:t>
+              <a:t>19.04.2014</a:t>
             </a:fld>
             <a:endParaRPr lang="de-DE"/>
           </a:p>
@@ -4391,7 +4238,7 @@
       </p:sp>
       <p:sp>
         <p:nvSpPr>
-          <p:cNvPr id="5" name="Fußzeilenplatzhalter 4"/>
+          <p:cNvPr id="4" name="Fußzeilenplatzhalter 3"/>
           <p:cNvSpPr>
             <a:spLocks noGrp="1"/>
           </p:cNvSpPr>
@@ -4406,15 +4253,15 @@
           <a:p>
             <a:r>
               <a:rPr lang="de-DE" smtClean="0"/>
-              <a:t>((Vorname Nachname))</a:t>
-            </a:r>
-            <a:endParaRPr lang="de-DE"/>
-          </a:p>
-        </p:txBody>
-      </p:sp>
-      <p:sp>
-        <p:nvSpPr>
-          <p:cNvPr id="6" name="Foliennummernplatzhalter 5"/>
+              <a:t>Matthias Krebs, Simon Laube</a:t>
+            </a:r>
+            <a:endParaRPr lang="de-DE" dirty="0"/>
+          </a:p>
+        </p:txBody>
+      </p:sp>
+      <p:sp>
+        <p:nvSpPr>
+          <p:cNvPr id="5" name="Foliennummernplatzhalter 4"/>
           <p:cNvSpPr>
             <a:spLocks noGrp="1"/>
           </p:cNvSpPr>
@@ -4438,22 +4285,32 @@
       </p:sp>
       <p:sp>
         <p:nvSpPr>
-          <p:cNvPr id="7" name="Bildplatzhalter 6"/>
-          <p:cNvSpPr>
-            <a:spLocks noGrp="1"/>
-          </p:cNvSpPr>
-          <p:nvPr>
-            <p:ph type="pic" sz="quarter" idx="13"/>
+          <p:cNvPr id="6" name="Titel 5"/>
+          <p:cNvSpPr>
+            <a:spLocks noGrp="1"/>
+          </p:cNvSpPr>
+          <p:nvPr>
+            <p:ph type="title"/>
           </p:nvPr>
         </p:nvSpPr>
         <p:spPr/>
+        <p:txBody>
+          <a:bodyPr/>
+          <a:lstStyle/>
+          <a:p>
+            <a:r>
+              <a:rPr lang="de-CH" dirty="0" err="1" smtClean="0"/>
+              <a:t>Context</a:t>
+            </a:r>
+            <a:r>
+              <a:rPr lang="de-CH" dirty="0" smtClean="0"/>
+              <a:t> / General Description</a:t>
+            </a:r>
+            <a:endParaRPr lang="de-CH" dirty="0"/>
+          </a:p>
+        </p:txBody>
       </p:sp>
     </p:spTree>
-    <p:extLst>
-      <p:ext uri="{BB962C8B-B14F-4D97-AF65-F5344CB8AC3E}">
-        <p14:creationId xmlns:p14="http://schemas.microsoft.com/office/powerpoint/2010/main" xmlns="" val="2652730742"/>
-      </p:ext>
-    </p:extLst>
   </p:cSld>
   <p:clrMapOvr>
     <a:masterClrMapping/>
@@ -4461,6 +4318,13 @@
   <p:transition>
     <p:fade/>
   </p:transition>
+  <p:timing>
+    <p:tnLst>
+      <p:par>
+        <p:cTn id="1" dur="indefinite" restart="never" nodeType="tmRoot"/>
+      </p:par>
+    </p:tnLst>
+  </p:timing>
 </p:sld>
 </file>
 
@@ -4483,12 +4347,176 @@
       </p:grpSpPr>
       <p:sp>
         <p:nvSpPr>
-          <p:cNvPr id="2" name="Titel 1"/>
-          <p:cNvSpPr>
-            <a:spLocks noGrp="1"/>
-          </p:cNvSpPr>
-          <p:nvPr>
-            <p:ph type="ctrTitle"/>
+          <p:cNvPr id="2" name="Inhaltsplatzhalter 1"/>
+          <p:cNvSpPr>
+            <a:spLocks noGrp="1"/>
+          </p:cNvSpPr>
+          <p:nvPr>
+            <p:ph idx="1"/>
+          </p:nvPr>
+        </p:nvSpPr>
+        <p:spPr>
+          <a:xfrm>
+            <a:off x="323850" y="2024064"/>
+            <a:ext cx="8496300" cy="2142494"/>
+          </a:xfrm>
+        </p:spPr>
+        <p:txBody>
+          <a:bodyPr/>
+          <a:lstStyle/>
+          <a:p>
+            <a:r>
+              <a:rPr lang="de-CH" dirty="0" err="1" smtClean="0"/>
+              <a:t>Nonlinear</a:t>
+            </a:r>
+            <a:r>
+              <a:rPr lang="de-CH" dirty="0" smtClean="0"/>
+              <a:t> Least </a:t>
+            </a:r>
+            <a:r>
+              <a:rPr lang="de-CH" dirty="0" err="1" smtClean="0"/>
+              <a:t>Squares</a:t>
+            </a:r>
+            <a:r>
+              <a:rPr lang="de-CH" dirty="0" smtClean="0"/>
+              <a:t> </a:t>
+            </a:r>
+            <a:r>
+              <a:rPr lang="de-CH" dirty="0" err="1" smtClean="0"/>
+              <a:t>Optimization</a:t>
+            </a:r>
+            <a:endParaRPr lang="de-CH" dirty="0" smtClean="0"/>
+          </a:p>
+          <a:p>
+            <a:pPr lvl="1"/>
+            <a:r>
+              <a:rPr lang="de-CH" dirty="0" smtClean="0"/>
+              <a:t> </a:t>
+            </a:r>
+            <a:br>
+              <a:rPr lang="de-CH" dirty="0" smtClean="0"/>
+            </a:br>
+            <a:r>
+              <a:rPr lang="de-CH" dirty="0" smtClean="0"/>
+              <a:t> </a:t>
+            </a:r>
+            <a:r>
+              <a:rPr lang="de-CH" dirty="0" smtClean="0"/>
+              <a:t/>
+            </a:r>
+            <a:br>
+              <a:rPr lang="de-CH" dirty="0" smtClean="0"/>
+            </a:br>
+            <a:r>
+              <a:rPr lang="de-CH" dirty="0" smtClean="0"/>
+              <a:t>   : Angular </a:t>
+            </a:r>
+            <a:r>
+              <a:rPr lang="de-CH" dirty="0" err="1" smtClean="0"/>
+              <a:t>acceleration</a:t>
+            </a:r>
+            <a:r>
+              <a:rPr lang="de-CH" dirty="0" smtClean="0"/>
+              <a:t> </a:t>
+            </a:r>
+            <a:r>
+              <a:rPr lang="de-CH" dirty="0" err="1" smtClean="0"/>
+              <a:t>from</a:t>
+            </a:r>
+            <a:r>
+              <a:rPr lang="de-CH" dirty="0" smtClean="0"/>
+              <a:t> </a:t>
+            </a:r>
+            <a:r>
+              <a:rPr lang="de-CH" dirty="0" err="1" smtClean="0"/>
+              <a:t>gyro</a:t>
+            </a:r>
+            <a:r>
+              <a:rPr lang="de-CH" dirty="0" smtClean="0"/>
+              <a:t> </a:t>
+            </a:r>
+            <a:r>
+              <a:rPr lang="de-CH" dirty="0" err="1" smtClean="0"/>
+              <a:t>measurement</a:t>
+            </a:r>
+            <a:r>
+              <a:rPr lang="de-CH" dirty="0" smtClean="0"/>
+              <a:t/>
+            </a:r>
+            <a:br>
+              <a:rPr lang="de-CH" dirty="0" smtClean="0"/>
+            </a:br>
+            <a:r>
+              <a:rPr lang="de-CH" dirty="0" smtClean="0"/>
+              <a:t> </a:t>
+            </a:r>
+            <a:r>
+              <a:rPr lang="de-CH" dirty="0" smtClean="0"/>
+              <a:t>          : </a:t>
+            </a:r>
+            <a:r>
+              <a:rPr lang="de-CH" dirty="0" err="1" smtClean="0"/>
+              <a:t>Nonlinear</a:t>
+            </a:r>
+            <a:r>
+              <a:rPr lang="de-CH" dirty="0" smtClean="0"/>
+              <a:t> </a:t>
+            </a:r>
+            <a:r>
+              <a:rPr lang="de-CH" dirty="0" err="1" smtClean="0"/>
+              <a:t>function</a:t>
+            </a:r>
+            <a:r>
+              <a:rPr lang="de-CH" dirty="0" smtClean="0"/>
+              <a:t> </a:t>
+            </a:r>
+            <a:r>
+              <a:rPr lang="de-CH" dirty="0" err="1" smtClean="0"/>
+              <a:t>depending</a:t>
+            </a:r>
+            <a:r>
+              <a:rPr lang="de-CH" dirty="0" smtClean="0"/>
+              <a:t> on </a:t>
+            </a:r>
+            <a:r>
+              <a:rPr lang="de-CH" dirty="0" err="1" smtClean="0"/>
+              <a:t>inputs</a:t>
+            </a:r>
+            <a:r>
+              <a:rPr lang="de-CH" dirty="0" smtClean="0"/>
+              <a:t>    </a:t>
+            </a:r>
+            <a:r>
+              <a:rPr lang="de-CH" dirty="0" err="1" smtClean="0"/>
+              <a:t>and</a:t>
+            </a:r>
+            <a:r>
+              <a:rPr lang="de-CH" dirty="0" smtClean="0"/>
+              <a:t> </a:t>
+            </a:r>
+            <a:r>
+              <a:rPr lang="de-CH" dirty="0" err="1" smtClean="0"/>
+              <a:t>parameters</a:t>
+            </a:r>
+            <a:endParaRPr lang="de-CH" dirty="0" smtClean="0"/>
+          </a:p>
+          <a:p>
+            <a:r>
+              <a:rPr lang="de-CH" dirty="0" err="1" smtClean="0"/>
+              <a:t>Parametrization</a:t>
+            </a:r>
+            <a:endParaRPr lang="de-CH" dirty="0" smtClean="0"/>
+          </a:p>
+        </p:txBody>
+      </p:sp>
+      <p:sp>
+        <p:nvSpPr>
+          <p:cNvPr id="3" name="Datumsplatzhalter 2"/>
+          <p:cNvSpPr>
+            <a:spLocks noGrp="1"/>
+          </p:cNvSpPr>
+          <p:nvPr>
+            <p:ph type="dt" sz="half" idx="10"/>
           </p:nvPr>
         </p:nvSpPr>
         <p:spPr/>
@@ -4496,48 +4524,10 @@
           <a:bodyPr/>
           <a:lstStyle/>
           <a:p>
-            <a:endParaRPr lang="de-CH"/>
-          </a:p>
-        </p:txBody>
-      </p:sp>
-      <p:sp>
-        <p:nvSpPr>
-          <p:cNvPr id="3" name="Untertitel 2"/>
-          <p:cNvSpPr>
-            <a:spLocks noGrp="1"/>
-          </p:cNvSpPr>
-          <p:nvPr>
-            <p:ph type="subTitle" idx="1"/>
-          </p:nvPr>
-        </p:nvSpPr>
-        <p:spPr/>
-        <p:txBody>
-          <a:bodyPr/>
-          <a:lstStyle/>
-          <a:p>
-            <a:endParaRPr lang="de-CH"/>
-          </a:p>
-        </p:txBody>
-      </p:sp>
-      <p:sp>
-        <p:nvSpPr>
-          <p:cNvPr id="4" name="Datumsplatzhalter 3"/>
-          <p:cNvSpPr>
-            <a:spLocks noGrp="1"/>
-          </p:cNvSpPr>
-          <p:nvPr>
-            <p:ph type="dt" sz="half" idx="10"/>
-          </p:nvPr>
-        </p:nvSpPr>
-        <p:spPr/>
-        <p:txBody>
-          <a:bodyPr/>
-          <a:lstStyle/>
-          <a:p>
-            <a:fld id="{0E397BD4-0686-495C-8D8F-54DB8CB790DF}" type="datetime1">
+            <a:fld id="{3B2F6CB8-9391-4BED-909F-C47A979AE1C4}" type="datetime1">
               <a:rPr lang="de-DE" smtClean="0"/>
               <a:pPr/>
-              <a:t>17.04.2014</a:t>
+              <a:t>19.04.2014</a:t>
             </a:fld>
             <a:endParaRPr lang="de-DE"/>
           </a:p>
@@ -4545,7 +4535,7 @@
       </p:sp>
       <p:sp>
         <p:nvSpPr>
-          <p:cNvPr id="5" name="Fußzeilenplatzhalter 4"/>
+          <p:cNvPr id="4" name="Fußzeilenplatzhalter 3"/>
           <p:cNvSpPr>
             <a:spLocks noGrp="1"/>
           </p:cNvSpPr>
@@ -4560,15 +4550,15 @@
           <a:p>
             <a:r>
               <a:rPr lang="de-DE" smtClean="0"/>
-              <a:t>((Vorname Nachname))</a:t>
-            </a:r>
-            <a:endParaRPr lang="de-DE"/>
-          </a:p>
-        </p:txBody>
-      </p:sp>
-      <p:sp>
-        <p:nvSpPr>
-          <p:cNvPr id="6" name="Foliennummernplatzhalter 5"/>
+              <a:t>Matthias Krebs, Simon Laube</a:t>
+            </a:r>
+            <a:endParaRPr lang="de-DE" dirty="0"/>
+          </a:p>
+        </p:txBody>
+      </p:sp>
+      <p:sp>
+        <p:nvSpPr>
+          <p:cNvPr id="5" name="Foliennummernplatzhalter 4"/>
           <p:cNvSpPr>
             <a:spLocks noGrp="1"/>
           </p:cNvSpPr>
@@ -4592,22 +4582,575 @@
       </p:sp>
       <p:sp>
         <p:nvSpPr>
-          <p:cNvPr id="7" name="Bildplatzhalter 6"/>
-          <p:cNvSpPr>
-            <a:spLocks noGrp="1"/>
-          </p:cNvSpPr>
-          <p:nvPr>
-            <p:ph type="pic" sz="quarter" idx="13"/>
+          <p:cNvPr id="6" name="Titel 5"/>
+          <p:cNvSpPr>
+            <a:spLocks noGrp="1"/>
+          </p:cNvSpPr>
+          <p:nvPr>
+            <p:ph type="title"/>
           </p:nvPr>
         </p:nvSpPr>
         <p:spPr/>
-      </p:sp>
+        <p:txBody>
+          <a:bodyPr/>
+          <a:lstStyle/>
+          <a:p>
+            <a:r>
+              <a:rPr lang="de-CH" dirty="0" smtClean="0"/>
+              <a:t>Problem </a:t>
+            </a:r>
+            <a:r>
+              <a:rPr lang="de-CH" dirty="0" err="1" smtClean="0"/>
+              <a:t>Formulation</a:t>
+            </a:r>
+            <a:endParaRPr lang="de-CH" dirty="0"/>
+          </a:p>
+        </p:txBody>
+      </p:sp>
+      <p:graphicFrame>
+        <p:nvGraphicFramePr>
+          <p:cNvPr id="7" name="Objekt 6"/>
+          <p:cNvGraphicFramePr>
+            <a:graphicFrameLocks noChangeAspect="1"/>
+          </p:cNvGraphicFramePr>
+          <p:nvPr/>
+        </p:nvGraphicFramePr>
+        <p:xfrm>
+          <a:off x="1056854" y="2329137"/>
+          <a:ext cx="2223329" cy="595222"/>
+        </p:xfrm>
+        <a:graphic>
+          <a:graphicData uri="http://schemas.openxmlformats.org/presentationml/2006/ole">
+            <p:oleObj spid="_x0000_s1026" name="Formel" r:id="rId3" imgW="1612800" imgH="431640" progId="Equation.3">
+              <p:embed/>
+            </p:oleObj>
+          </a:graphicData>
+        </a:graphic>
+      </p:graphicFrame>
+      <p:graphicFrame>
+        <p:nvGraphicFramePr>
+          <p:cNvPr id="1027" name="Object 3"/>
+          <p:cNvGraphicFramePr>
+            <a:graphicFrameLocks noChangeAspect="1"/>
+          </p:cNvGraphicFramePr>
+          <p:nvPr/>
+        </p:nvGraphicFramePr>
+        <p:xfrm>
+          <a:off x="1056854" y="3377781"/>
+          <a:ext cx="735013" cy="314325"/>
+        </p:xfrm>
+        <a:graphic>
+          <a:graphicData uri="http://schemas.openxmlformats.org/presentationml/2006/ole">
+            <p:oleObj spid="_x0000_s1027" name="Formel" r:id="rId4" imgW="533160" imgH="228600" progId="Equation.3">
+              <p:embed/>
+            </p:oleObj>
+          </a:graphicData>
+        </a:graphic>
+      </p:graphicFrame>
+      <p:graphicFrame>
+        <p:nvGraphicFramePr>
+          <p:cNvPr id="1028" name="Object 4"/>
+          <p:cNvGraphicFramePr>
+            <a:graphicFrameLocks noChangeAspect="1"/>
+          </p:cNvGraphicFramePr>
+          <p:nvPr/>
+        </p:nvGraphicFramePr>
+        <p:xfrm>
+          <a:off x="1056854" y="3063456"/>
+          <a:ext cx="227013" cy="314325"/>
+        </p:xfrm>
+        <a:graphic>
+          <a:graphicData uri="http://schemas.openxmlformats.org/presentationml/2006/ole">
+            <p:oleObj spid="_x0000_s1028" name="Formel" r:id="rId5" imgW="164880" imgH="228600" progId="Equation.3">
+              <p:embed/>
+            </p:oleObj>
+          </a:graphicData>
+        </a:graphic>
+      </p:graphicFrame>
+      <p:graphicFrame>
+        <p:nvGraphicFramePr>
+          <p:cNvPr id="1029" name="Object 5"/>
+          <p:cNvGraphicFramePr>
+            <a:graphicFrameLocks noChangeAspect="1"/>
+          </p:cNvGraphicFramePr>
+          <p:nvPr/>
+        </p:nvGraphicFramePr>
+        <p:xfrm>
+          <a:off x="6430992" y="3377781"/>
+          <a:ext cx="228600" cy="314325"/>
+        </p:xfrm>
+        <a:graphic>
+          <a:graphicData uri="http://schemas.openxmlformats.org/presentationml/2006/ole">
+            <p:oleObj spid="_x0000_s1029" name="Formel" r:id="rId6" imgW="164880" imgH="228600" progId="Equation.3">
+              <p:embed/>
+            </p:oleObj>
+          </a:graphicData>
+        </a:graphic>
+      </p:graphicFrame>
+      <p:graphicFrame>
+        <p:nvGraphicFramePr>
+          <p:cNvPr id="1030" name="Object 6"/>
+          <p:cNvGraphicFramePr>
+            <a:graphicFrameLocks noChangeAspect="1"/>
+          </p:cNvGraphicFramePr>
+          <p:nvPr/>
+        </p:nvGraphicFramePr>
+        <p:xfrm>
+          <a:off x="8461585" y="3395033"/>
+          <a:ext cx="176213" cy="244475"/>
+        </p:xfrm>
+        <a:graphic>
+          <a:graphicData uri="http://schemas.openxmlformats.org/presentationml/2006/ole">
+            <p:oleObj spid="_x0000_s1030" name="Formel" r:id="rId7" imgW="126720" imgH="177480" progId="Equation.3">
+              <p:embed/>
+            </p:oleObj>
+          </a:graphicData>
+        </a:graphic>
+      </p:graphicFrame>
+      <p:sp>
+        <p:nvSpPr>
+          <p:cNvPr id="12" name="Inhaltsplatzhalter 1"/>
+          <p:cNvSpPr txBox="1">
+            <a:spLocks/>
+          </p:cNvSpPr>
+          <p:nvPr/>
+        </p:nvSpPr>
+        <p:spPr>
+          <a:xfrm>
+            <a:off x="476250" y="4166558"/>
+            <a:ext cx="8496300" cy="1992702"/>
+          </a:xfrm>
+          <a:prstGeom prst="rect">
+            <a:avLst/>
+          </a:prstGeom>
+        </p:spPr>
+        <p:txBody>
+          <a:bodyPr vert="horz" lIns="140400" tIns="0" rIns="144000" bIns="0" rtlCol="0">
+            <a:noAutofit/>
+          </a:bodyPr>
+          <a:lstStyle/>
+          <a:p>
+            <a:pPr marL="361950" marR="0" lvl="0" indent="-361950" algn="l" defTabSz="914400" rtl="0" eaLnBrk="1" fontAlgn="auto" latinLnBrk="0" hangingPunct="1">
+              <a:lnSpc>
+                <a:spcPct val="100000"/>
+              </a:lnSpc>
+              <a:spcBef>
+                <a:spcPts val="500"/>
+              </a:spcBef>
+              <a:spcAft>
+                <a:spcPts val="0"/>
+              </a:spcAft>
+              <a:buClr>
+                <a:schemeClr val="accent4"/>
+              </a:buClr>
+              <a:buSzTx/>
+              <a:buFont typeface="Wingdings" pitchFamily="2" charset="2"/>
+              <a:buChar char="§"/>
+              <a:tabLst/>
+              <a:defRPr/>
+            </a:pPr>
+            <a:endParaRPr kumimoji="0" lang="de-CH" sz="2400" b="0" i="0" u="none" strike="noStrike" kern="1200" cap="none" spc="0" normalizeH="0" baseline="0" noProof="0" dirty="0" smtClean="0">
+              <a:ln>
+                <a:noFill/>
+              </a:ln>
+              <a:solidFill>
+                <a:schemeClr val="tx1"/>
+              </a:solidFill>
+              <a:effectLst/>
+              <a:uLnTx/>
+              <a:uFillTx/>
+              <a:latin typeface="+mn-lt"/>
+              <a:ea typeface="+mn-ea"/>
+              <a:cs typeface="+mn-cs"/>
+            </a:endParaRPr>
+          </a:p>
+        </p:txBody>
+      </p:sp>
+      <p:sp>
+        <p:nvSpPr>
+          <p:cNvPr id="14" name="Rechteck 13"/>
+          <p:cNvSpPr/>
+          <p:nvPr/>
+        </p:nvSpPr>
+        <p:spPr>
+          <a:xfrm>
+            <a:off x="845389" y="4166558"/>
+            <a:ext cx="3545456" cy="1811548"/>
+          </a:xfrm>
+          <a:prstGeom prst="rect">
+            <a:avLst/>
+          </a:prstGeom>
+          <a:ln/>
+        </p:spPr>
+        <p:style>
+          <a:lnRef idx="2">
+            <a:schemeClr val="accent4"/>
+          </a:lnRef>
+          <a:fillRef idx="1">
+            <a:schemeClr val="lt1"/>
+          </a:fillRef>
+          <a:effectRef idx="0">
+            <a:schemeClr val="accent4"/>
+          </a:effectRef>
+          <a:fontRef idx="minor">
+            <a:schemeClr val="dk1"/>
+          </a:fontRef>
+        </p:style>
+        <p:txBody>
+          <a:bodyPr rtlCol="0" anchor="ctr"/>
+          <a:lstStyle/>
+          <a:p>
+            <a:pPr marL="361950" indent="-361950">
+              <a:spcBef>
+                <a:spcPts val="500"/>
+              </a:spcBef>
+              <a:buClr>
+                <a:schemeClr val="accent4"/>
+              </a:buClr>
+            </a:pPr>
+            <a:r>
+              <a:rPr lang="de-CH" sz="2400" b="1" dirty="0" smtClean="0">
+                <a:solidFill>
+                  <a:schemeClr val="tx1"/>
+                </a:solidFill>
+              </a:rPr>
+              <a:t>Quaternion</a:t>
+            </a:r>
+          </a:p>
+          <a:p>
+            <a:pPr marL="361950" indent="-361950">
+              <a:spcBef>
+                <a:spcPts val="500"/>
+              </a:spcBef>
+              <a:buClr>
+                <a:schemeClr val="accent4"/>
+              </a:buClr>
+            </a:pPr>
+            <a:r>
+              <a:rPr lang="de-CH" dirty="0" err="1" smtClean="0"/>
+              <a:t>No</a:t>
+            </a:r>
+            <a:r>
+              <a:rPr lang="de-CH" dirty="0" smtClean="0"/>
+              <a:t> </a:t>
+            </a:r>
+            <a:r>
+              <a:rPr lang="de-CH" dirty="0" err="1" smtClean="0"/>
+              <a:t>Singularities</a:t>
+            </a:r>
+            <a:endParaRPr lang="de-CH" dirty="0" smtClean="0"/>
+          </a:p>
+          <a:p>
+            <a:pPr marL="361950" indent="-361950">
+              <a:spcBef>
+                <a:spcPts val="500"/>
+              </a:spcBef>
+              <a:buClr>
+                <a:schemeClr val="accent4"/>
+              </a:buClr>
+            </a:pPr>
+            <a:r>
+              <a:rPr lang="de-CH" dirty="0" err="1" smtClean="0"/>
+              <a:t>Constrained</a:t>
+            </a:r>
+            <a:endParaRPr lang="de-CH" dirty="0" smtClean="0"/>
+          </a:p>
+          <a:p>
+            <a:pPr marL="361950" indent="-361950">
+              <a:spcBef>
+                <a:spcPts val="500"/>
+              </a:spcBef>
+              <a:buClr>
+                <a:schemeClr val="accent4"/>
+              </a:buClr>
+            </a:pPr>
+            <a:r>
+              <a:rPr lang="de-CH" dirty="0" err="1" smtClean="0"/>
+              <a:t>Quadratic</a:t>
+            </a:r>
+            <a:r>
+              <a:rPr lang="de-CH" dirty="0" smtClean="0"/>
+              <a:t> </a:t>
+            </a:r>
+            <a:r>
+              <a:rPr lang="de-CH" dirty="0" smtClean="0"/>
+              <a:t>model</a:t>
+            </a:r>
+            <a:endParaRPr lang="de-CH" dirty="0"/>
+          </a:p>
+        </p:txBody>
+      </p:sp>
+      <p:sp>
+        <p:nvSpPr>
+          <p:cNvPr id="15" name="Rechteck 14"/>
+          <p:cNvSpPr/>
+          <p:nvPr/>
+        </p:nvSpPr>
+        <p:spPr>
+          <a:xfrm>
+            <a:off x="4779034" y="4166557"/>
+            <a:ext cx="3539830" cy="1811549"/>
+          </a:xfrm>
+          <a:prstGeom prst="rect">
+            <a:avLst/>
+          </a:prstGeom>
+          <a:ln/>
+        </p:spPr>
+        <p:style>
+          <a:lnRef idx="2">
+            <a:schemeClr val="accent4"/>
+          </a:lnRef>
+          <a:fillRef idx="1">
+            <a:schemeClr val="lt1"/>
+          </a:fillRef>
+          <a:effectRef idx="0">
+            <a:schemeClr val="accent4"/>
+          </a:effectRef>
+          <a:fontRef idx="minor">
+            <a:schemeClr val="dk1"/>
+          </a:fontRef>
+        </p:style>
+        <p:txBody>
+          <a:bodyPr rtlCol="0" anchor="ctr"/>
+          <a:lstStyle/>
+          <a:p>
+            <a:pPr marL="361950" indent="-361950">
+              <a:spcBef>
+                <a:spcPts val="500"/>
+              </a:spcBef>
+              <a:buClr>
+                <a:schemeClr val="accent4"/>
+              </a:buClr>
+            </a:pPr>
+            <a:r>
+              <a:rPr lang="de-CH" sz="2400" b="1" dirty="0" smtClean="0"/>
+              <a:t>Gibbs-Rodriguez</a:t>
+            </a:r>
+            <a:endParaRPr lang="de-CH" sz="2400" b="1" dirty="0" smtClean="0"/>
+          </a:p>
+          <a:p>
+            <a:pPr marL="361950" indent="-361950">
+              <a:spcBef>
+                <a:spcPts val="500"/>
+              </a:spcBef>
+              <a:buClr>
+                <a:schemeClr val="accent4"/>
+              </a:buClr>
+            </a:pPr>
+            <a:r>
+              <a:rPr lang="de-CH" dirty="0" err="1" smtClean="0"/>
+              <a:t>Singularity</a:t>
+            </a:r>
+            <a:r>
+              <a:rPr lang="de-CH" dirty="0" smtClean="0"/>
+              <a:t> </a:t>
+            </a:r>
+            <a:r>
+              <a:rPr lang="de-CH" dirty="0" err="1" smtClean="0"/>
+              <a:t>at</a:t>
+            </a:r>
+            <a:r>
+              <a:rPr lang="de-CH" dirty="0" smtClean="0"/>
+              <a:t> </a:t>
+            </a:r>
+            <a:endParaRPr lang="de-CH" dirty="0" smtClean="0"/>
+          </a:p>
+          <a:p>
+            <a:pPr marL="361950" indent="-361950">
+              <a:spcBef>
+                <a:spcPts val="500"/>
+              </a:spcBef>
+              <a:buClr>
+                <a:schemeClr val="accent4"/>
+              </a:buClr>
+            </a:pPr>
+            <a:r>
+              <a:rPr lang="de-CH" dirty="0" err="1" smtClean="0"/>
+              <a:t>Unconstrained</a:t>
+            </a:r>
+            <a:endParaRPr lang="de-CH" dirty="0" smtClean="0"/>
+          </a:p>
+          <a:p>
+            <a:pPr marL="361950" indent="-361950">
+              <a:spcBef>
+                <a:spcPts val="500"/>
+              </a:spcBef>
+              <a:buClr>
+                <a:schemeClr val="accent4"/>
+              </a:buClr>
+            </a:pPr>
+            <a:r>
+              <a:rPr lang="de-CH" dirty="0" err="1" smtClean="0"/>
+              <a:t>Nonlinear</a:t>
+            </a:r>
+            <a:r>
+              <a:rPr lang="de-CH" dirty="0" smtClean="0"/>
+              <a:t> model</a:t>
+            </a:r>
+          </a:p>
+        </p:txBody>
+      </p:sp>
+      <p:graphicFrame>
+        <p:nvGraphicFramePr>
+          <p:cNvPr id="1031" name="Object 7"/>
+          <p:cNvGraphicFramePr>
+            <a:graphicFrameLocks noChangeAspect="1"/>
+          </p:cNvGraphicFramePr>
+          <p:nvPr/>
+        </p:nvGraphicFramePr>
+        <p:xfrm>
+          <a:off x="6892924" y="5536946"/>
+          <a:ext cx="1381125" cy="280988"/>
+        </p:xfrm>
+        <a:graphic>
+          <a:graphicData uri="http://schemas.openxmlformats.org/presentationml/2006/ole">
+            <p:oleObj spid="_x0000_s1031" name="Formel" r:id="rId8" imgW="1002960" imgH="203040" progId="Equation.3">
+              <p:embed/>
+            </p:oleObj>
+          </a:graphicData>
+        </a:graphic>
+      </p:graphicFrame>
+      <p:graphicFrame>
+        <p:nvGraphicFramePr>
+          <p:cNvPr id="1032" name="Object 8"/>
+          <p:cNvGraphicFramePr>
+            <a:graphicFrameLocks noChangeAspect="1"/>
+          </p:cNvGraphicFramePr>
+          <p:nvPr/>
+        </p:nvGraphicFramePr>
+        <p:xfrm>
+          <a:off x="2870020" y="5346281"/>
+          <a:ext cx="1520825" cy="631825"/>
+        </p:xfrm>
+        <a:graphic>
+          <a:graphicData uri="http://schemas.openxmlformats.org/presentationml/2006/ole">
+            <p:oleObj spid="_x0000_s1032" name="Formel" r:id="rId9" imgW="1104840" imgH="457200" progId="Equation.3">
+              <p:embed/>
+            </p:oleObj>
+          </a:graphicData>
+        </a:graphic>
+      </p:graphicFrame>
+      <p:graphicFrame>
+        <p:nvGraphicFramePr>
+          <p:cNvPr id="1033" name="Object 9"/>
+          <p:cNvGraphicFramePr>
+            <a:graphicFrameLocks noChangeAspect="1"/>
+          </p:cNvGraphicFramePr>
+          <p:nvPr/>
+        </p:nvGraphicFramePr>
+        <p:xfrm>
+          <a:off x="6275417" y="4834476"/>
+          <a:ext cx="768350" cy="280988"/>
+        </p:xfrm>
+        <a:graphic>
+          <a:graphicData uri="http://schemas.openxmlformats.org/presentationml/2006/ole">
+            <p:oleObj spid="_x0000_s1033" name="Formel" r:id="rId10" imgW="558720" imgH="203040" progId="Equation.3">
+              <p:embed/>
+            </p:oleObj>
+          </a:graphicData>
+        </a:graphic>
+      </p:graphicFrame>
+      <p:sp>
+        <p:nvSpPr>
+          <p:cNvPr id="19" name="Rechteck 18"/>
+          <p:cNvSpPr/>
+          <p:nvPr/>
+        </p:nvSpPr>
+        <p:spPr>
+          <a:xfrm>
+            <a:off x="2870020" y="5346280"/>
+            <a:ext cx="1520825" cy="631825"/>
+          </a:xfrm>
+          <a:prstGeom prst="rect">
+            <a:avLst/>
+          </a:prstGeom>
+          <a:noFill/>
+          <a:ln/>
+        </p:spPr>
+        <p:style>
+          <a:lnRef idx="2">
+            <a:schemeClr val="accent4"/>
+          </a:lnRef>
+          <a:fillRef idx="1">
+            <a:schemeClr val="lt1"/>
+          </a:fillRef>
+          <a:effectRef idx="0">
+            <a:schemeClr val="accent4"/>
+          </a:effectRef>
+          <a:fontRef idx="minor">
+            <a:schemeClr val="dk1"/>
+          </a:fontRef>
+        </p:style>
+        <p:txBody>
+          <a:bodyPr rtlCol="0" anchor="ctr"/>
+          <a:lstStyle/>
+          <a:p>
+            <a:pPr algn="ctr"/>
+            <a:endParaRPr lang="de-CH"/>
+          </a:p>
+        </p:txBody>
+      </p:sp>
+      <p:sp>
+        <p:nvSpPr>
+          <p:cNvPr id="20" name="Rechteck 19"/>
+          <p:cNvSpPr/>
+          <p:nvPr/>
+        </p:nvSpPr>
+        <p:spPr>
+          <a:xfrm>
+            <a:off x="6798038" y="5346281"/>
+            <a:ext cx="1520825" cy="631825"/>
+          </a:xfrm>
+          <a:prstGeom prst="rect">
+            <a:avLst/>
+          </a:prstGeom>
+          <a:noFill/>
+          <a:ln/>
+        </p:spPr>
+        <p:style>
+          <a:lnRef idx="2">
+            <a:schemeClr val="accent4"/>
+          </a:lnRef>
+          <a:fillRef idx="1">
+            <a:schemeClr val="lt1"/>
+          </a:fillRef>
+          <a:effectRef idx="0">
+            <a:schemeClr val="accent4"/>
+          </a:effectRef>
+          <a:fontRef idx="minor">
+            <a:schemeClr val="dk1"/>
+          </a:fontRef>
+        </p:style>
+        <p:txBody>
+          <a:bodyPr rtlCol="0" anchor="ctr"/>
+          <a:lstStyle/>
+          <a:p>
+            <a:pPr algn="ctr"/>
+            <a:endParaRPr lang="de-CH"/>
+          </a:p>
+        </p:txBody>
+      </p:sp>
+      <p:graphicFrame>
+        <p:nvGraphicFramePr>
+          <p:cNvPr id="1034" name="Object 10"/>
+          <p:cNvGraphicFramePr>
+            <a:graphicFrameLocks noChangeAspect="1"/>
+          </p:cNvGraphicFramePr>
+          <p:nvPr/>
+        </p:nvGraphicFramePr>
+        <p:xfrm>
+          <a:off x="2157922" y="5115464"/>
+          <a:ext cx="558800" cy="351886"/>
+        </p:xfrm>
+        <a:graphic>
+          <a:graphicData uri="http://schemas.openxmlformats.org/presentationml/2006/ole">
+            <p:oleObj spid="_x0000_s1034" name="Formel" r:id="rId11" imgW="406080" imgH="253800" progId="Equation.3">
+              <p:embed/>
+            </p:oleObj>
+          </a:graphicData>
+        </a:graphic>
+      </p:graphicFrame>
     </p:spTree>
-    <p:extLst>
-      <p:ext uri="{BB962C8B-B14F-4D97-AF65-F5344CB8AC3E}">
-        <p14:creationId xmlns:p14="http://schemas.microsoft.com/office/powerpoint/2010/main" xmlns="" val="3589762078"/>
-      </p:ext>
-    </p:extLst>
   </p:cSld>
   <p:clrMapOvr>
     <a:masterClrMapping/>
@@ -4615,6 +5158,13 @@
   <p:transition>
     <p:fade/>
   </p:transition>
+  <p:timing>
+    <p:tnLst>
+      <p:par>
+        <p:cTn id="1" dur="indefinite" restart="never" nodeType="tmRoot"/>
+      </p:par>
+    </p:tnLst>
+  </p:timing>
 </p:sld>
 </file>
 
@@ -4637,12 +5187,12 @@
       </p:grpSpPr>
       <p:sp>
         <p:nvSpPr>
-          <p:cNvPr id="2" name="Untertitel 1"/>
-          <p:cNvSpPr>
-            <a:spLocks noGrp="1"/>
-          </p:cNvSpPr>
-          <p:nvPr>
-            <p:ph type="subTitle" idx="1"/>
+          <p:cNvPr id="3" name="Datumsplatzhalter 2"/>
+          <p:cNvSpPr>
+            <a:spLocks noGrp="1"/>
+          </p:cNvSpPr>
+          <p:nvPr>
+            <p:ph type="dt" sz="half" idx="10"/>
           </p:nvPr>
         </p:nvSpPr>
         <p:spPr/>
@@ -4650,18 +5200,23 @@
           <a:bodyPr/>
           <a:lstStyle/>
           <a:p>
-            <a:endParaRPr lang="de-CH"/>
-          </a:p>
-        </p:txBody>
-      </p:sp>
-      <p:sp>
-        <p:nvSpPr>
-          <p:cNvPr id="3" name="Titel 2"/>
-          <p:cNvSpPr>
-            <a:spLocks noGrp="1"/>
-          </p:cNvSpPr>
-          <p:nvPr>
-            <p:ph type="ctrTitle"/>
+            <a:fld id="{3B2F6CB8-9391-4BED-909F-C47A979AE1C4}" type="datetime1">
+              <a:rPr lang="de-DE" smtClean="0"/>
+              <a:pPr/>
+              <a:t>19.04.2014</a:t>
+            </a:fld>
+            <a:endParaRPr lang="de-DE"/>
+          </a:p>
+        </p:txBody>
+      </p:sp>
+      <p:sp>
+        <p:nvSpPr>
+          <p:cNvPr id="4" name="Fußzeilenplatzhalter 3"/>
+          <p:cNvSpPr>
+            <a:spLocks noGrp="1"/>
+          </p:cNvSpPr>
+          <p:nvPr>
+            <p:ph type="ftr" sz="quarter" idx="11"/>
           </p:nvPr>
         </p:nvSpPr>
         <p:spPr/>
@@ -4669,16 +5224,517 @@
           <a:bodyPr/>
           <a:lstStyle/>
           <a:p>
-            <a:endParaRPr lang="de-CH"/>
-          </a:p>
-        </p:txBody>
-      </p:sp>
+            <a:r>
+              <a:rPr lang="de-DE" smtClean="0"/>
+              <a:t>Matthias Krebs, Simon Laube</a:t>
+            </a:r>
+            <a:endParaRPr lang="de-DE" dirty="0"/>
+          </a:p>
+        </p:txBody>
+      </p:sp>
+      <p:sp>
+        <p:nvSpPr>
+          <p:cNvPr id="5" name="Foliennummernplatzhalter 4"/>
+          <p:cNvSpPr>
+            <a:spLocks noGrp="1"/>
+          </p:cNvSpPr>
+          <p:nvPr>
+            <p:ph type="sldNum" sz="quarter" idx="12"/>
+          </p:nvPr>
+        </p:nvSpPr>
+        <p:spPr/>
+        <p:txBody>
+          <a:bodyPr/>
+          <a:lstStyle/>
+          <a:p>
+            <a:fld id="{6C6AE60A-B69C-4790-82F7-3882EDF23186}" type="slidenum">
+              <a:rPr lang="de-DE" smtClean="0"/>
+              <a:pPr/>
+              <a:t>4</a:t>
+            </a:fld>
+            <a:endParaRPr lang="de-DE"/>
+          </a:p>
+        </p:txBody>
+      </p:sp>
+      <p:sp>
+        <p:nvSpPr>
+          <p:cNvPr id="6" name="Titel 5"/>
+          <p:cNvSpPr>
+            <a:spLocks noGrp="1"/>
+          </p:cNvSpPr>
+          <p:nvPr>
+            <p:ph type="title"/>
+          </p:nvPr>
+        </p:nvSpPr>
+        <p:spPr/>
+        <p:txBody>
+          <a:bodyPr/>
+          <a:lstStyle/>
+          <a:p>
+            <a:r>
+              <a:rPr lang="de-CH" dirty="0" smtClean="0"/>
+              <a:t>Problem </a:t>
+            </a:r>
+            <a:r>
+              <a:rPr lang="de-CH" dirty="0" err="1" smtClean="0"/>
+              <a:t>Formulation</a:t>
+            </a:r>
+            <a:endParaRPr lang="de-CH" dirty="0"/>
+          </a:p>
+        </p:txBody>
+      </p:sp>
+      <p:grpSp>
+        <p:nvGrpSpPr>
+          <p:cNvPr id="24" name="Gruppieren 23"/>
+          <p:cNvGrpSpPr/>
+          <p:nvPr/>
+        </p:nvGrpSpPr>
+        <p:grpSpPr>
+          <a:xfrm>
+            <a:off x="845389" y="1685880"/>
+            <a:ext cx="7473475" cy="1811549"/>
+            <a:chOff x="845389" y="1685880"/>
+            <a:chExt cx="7473475" cy="1811549"/>
+          </a:xfrm>
+        </p:grpSpPr>
+        <p:sp>
+          <p:nvSpPr>
+            <p:cNvPr id="14" name="Rechteck 13"/>
+            <p:cNvSpPr/>
+            <p:nvPr/>
+          </p:nvSpPr>
+          <p:spPr>
+            <a:xfrm>
+              <a:off x="845389" y="1685881"/>
+              <a:ext cx="3545456" cy="1811548"/>
+            </a:xfrm>
+            <a:prstGeom prst="rect">
+              <a:avLst/>
+            </a:prstGeom>
+            <a:ln/>
+          </p:spPr>
+          <p:style>
+            <a:lnRef idx="2">
+              <a:schemeClr val="accent4"/>
+            </a:lnRef>
+            <a:fillRef idx="1">
+              <a:schemeClr val="lt1"/>
+            </a:fillRef>
+            <a:effectRef idx="0">
+              <a:schemeClr val="accent4"/>
+            </a:effectRef>
+            <a:fontRef idx="minor">
+              <a:schemeClr val="dk1"/>
+            </a:fontRef>
+          </p:style>
+          <p:txBody>
+            <a:bodyPr rtlCol="0" anchor="ctr"/>
+            <a:lstStyle/>
+            <a:p>
+              <a:pPr marL="361950" indent="-361950">
+                <a:spcBef>
+                  <a:spcPts val="500"/>
+                </a:spcBef>
+                <a:buClr>
+                  <a:schemeClr val="accent4"/>
+                </a:buClr>
+              </a:pPr>
+              <a:r>
+                <a:rPr lang="de-CH" sz="2400" b="1" dirty="0" smtClean="0">
+                  <a:solidFill>
+                    <a:schemeClr val="tx1"/>
+                  </a:solidFill>
+                </a:rPr>
+                <a:t>Quaternion</a:t>
+              </a:r>
+            </a:p>
+            <a:p>
+              <a:pPr marL="361950" indent="-361950">
+                <a:spcBef>
+                  <a:spcPts val="500"/>
+                </a:spcBef>
+                <a:buClr>
+                  <a:schemeClr val="accent4"/>
+                </a:buClr>
+              </a:pPr>
+              <a:r>
+                <a:rPr lang="de-CH" dirty="0" err="1" smtClean="0"/>
+                <a:t>No</a:t>
+              </a:r>
+              <a:r>
+                <a:rPr lang="de-CH" dirty="0" smtClean="0"/>
+                <a:t> </a:t>
+              </a:r>
+              <a:r>
+                <a:rPr lang="de-CH" dirty="0" err="1" smtClean="0"/>
+                <a:t>Singularities</a:t>
+              </a:r>
+              <a:endParaRPr lang="de-CH" dirty="0" smtClean="0"/>
+            </a:p>
+            <a:p>
+              <a:pPr marL="361950" indent="-361950">
+                <a:spcBef>
+                  <a:spcPts val="500"/>
+                </a:spcBef>
+                <a:buClr>
+                  <a:schemeClr val="accent4"/>
+                </a:buClr>
+              </a:pPr>
+              <a:r>
+                <a:rPr lang="de-CH" dirty="0" err="1" smtClean="0"/>
+                <a:t>Constrained</a:t>
+              </a:r>
+              <a:endParaRPr lang="de-CH" dirty="0" smtClean="0"/>
+            </a:p>
+            <a:p>
+              <a:pPr marL="361950" indent="-361950">
+                <a:spcBef>
+                  <a:spcPts val="500"/>
+                </a:spcBef>
+                <a:buClr>
+                  <a:schemeClr val="accent4"/>
+                </a:buClr>
+              </a:pPr>
+              <a:r>
+                <a:rPr lang="de-CH" dirty="0" err="1" smtClean="0"/>
+                <a:t>Quadratic</a:t>
+              </a:r>
+              <a:r>
+                <a:rPr lang="de-CH" dirty="0" smtClean="0"/>
+                <a:t> </a:t>
+              </a:r>
+              <a:r>
+                <a:rPr lang="de-CH" dirty="0" smtClean="0"/>
+                <a:t>model</a:t>
+              </a:r>
+              <a:endParaRPr lang="de-CH" dirty="0"/>
+            </a:p>
+          </p:txBody>
+        </p:sp>
+        <p:sp>
+          <p:nvSpPr>
+            <p:cNvPr id="15" name="Rechteck 14"/>
+            <p:cNvSpPr/>
+            <p:nvPr/>
+          </p:nvSpPr>
+          <p:spPr>
+            <a:xfrm>
+              <a:off x="4779034" y="1685880"/>
+              <a:ext cx="3539830" cy="1811549"/>
+            </a:xfrm>
+            <a:prstGeom prst="rect">
+              <a:avLst/>
+            </a:prstGeom>
+            <a:ln/>
+          </p:spPr>
+          <p:style>
+            <a:lnRef idx="2">
+              <a:schemeClr val="accent4"/>
+            </a:lnRef>
+            <a:fillRef idx="1">
+              <a:schemeClr val="lt1"/>
+            </a:fillRef>
+            <a:effectRef idx="0">
+              <a:schemeClr val="accent4"/>
+            </a:effectRef>
+            <a:fontRef idx="minor">
+              <a:schemeClr val="dk1"/>
+            </a:fontRef>
+          </p:style>
+          <p:txBody>
+            <a:bodyPr rtlCol="0" anchor="ctr"/>
+            <a:lstStyle/>
+            <a:p>
+              <a:pPr marL="361950" indent="-361950">
+                <a:spcBef>
+                  <a:spcPts val="500"/>
+                </a:spcBef>
+                <a:buClr>
+                  <a:schemeClr val="accent4"/>
+                </a:buClr>
+              </a:pPr>
+              <a:r>
+                <a:rPr lang="de-CH" sz="2400" b="1" dirty="0" smtClean="0"/>
+                <a:t>Gibbs-Rodriguez</a:t>
+              </a:r>
+              <a:endParaRPr lang="de-CH" sz="2400" b="1" dirty="0" smtClean="0"/>
+            </a:p>
+            <a:p>
+              <a:pPr marL="361950" indent="-361950">
+                <a:spcBef>
+                  <a:spcPts val="500"/>
+                </a:spcBef>
+                <a:buClr>
+                  <a:schemeClr val="accent4"/>
+                </a:buClr>
+              </a:pPr>
+              <a:r>
+                <a:rPr lang="de-CH" dirty="0" err="1" smtClean="0"/>
+                <a:t>Singularity</a:t>
+              </a:r>
+              <a:r>
+                <a:rPr lang="de-CH" dirty="0" smtClean="0"/>
+                <a:t> </a:t>
+              </a:r>
+              <a:r>
+                <a:rPr lang="de-CH" dirty="0" err="1" smtClean="0"/>
+                <a:t>at</a:t>
+              </a:r>
+              <a:r>
+                <a:rPr lang="de-CH" dirty="0" smtClean="0"/>
+                <a:t> </a:t>
+              </a:r>
+              <a:endParaRPr lang="de-CH" dirty="0" smtClean="0"/>
+            </a:p>
+            <a:p>
+              <a:pPr marL="361950" indent="-361950">
+                <a:spcBef>
+                  <a:spcPts val="500"/>
+                </a:spcBef>
+                <a:buClr>
+                  <a:schemeClr val="accent4"/>
+                </a:buClr>
+              </a:pPr>
+              <a:r>
+                <a:rPr lang="de-CH" dirty="0" err="1" smtClean="0"/>
+                <a:t>Unconstrained</a:t>
+              </a:r>
+              <a:endParaRPr lang="de-CH" dirty="0" smtClean="0"/>
+            </a:p>
+            <a:p>
+              <a:pPr marL="361950" indent="-361950">
+                <a:spcBef>
+                  <a:spcPts val="500"/>
+                </a:spcBef>
+                <a:buClr>
+                  <a:schemeClr val="accent4"/>
+                </a:buClr>
+              </a:pPr>
+              <a:r>
+                <a:rPr lang="de-CH" dirty="0" err="1" smtClean="0"/>
+                <a:t>Nonlinear</a:t>
+              </a:r>
+              <a:r>
+                <a:rPr lang="de-CH" dirty="0" smtClean="0"/>
+                <a:t> model</a:t>
+              </a:r>
+            </a:p>
+          </p:txBody>
+        </p:sp>
+        <p:graphicFrame>
+          <p:nvGraphicFramePr>
+            <p:cNvPr id="1031" name="Object 7"/>
+            <p:cNvGraphicFramePr>
+              <a:graphicFrameLocks noChangeAspect="1"/>
+            </p:cNvGraphicFramePr>
+            <p:nvPr/>
+          </p:nvGraphicFramePr>
+          <p:xfrm>
+            <a:off x="6892924" y="3056269"/>
+            <a:ext cx="1381125" cy="280988"/>
+          </p:xfrm>
+          <a:graphic>
+            <a:graphicData uri="http://schemas.openxmlformats.org/presentationml/2006/ole">
+              <p:oleObj spid="_x0000_s2055" name="Formel" r:id="rId3" imgW="1002960" imgH="203040" progId="Equation.3">
+                <p:embed/>
+              </p:oleObj>
+            </a:graphicData>
+          </a:graphic>
+        </p:graphicFrame>
+        <p:graphicFrame>
+          <p:nvGraphicFramePr>
+            <p:cNvPr id="1032" name="Object 8"/>
+            <p:cNvGraphicFramePr>
+              <a:graphicFrameLocks noChangeAspect="1"/>
+            </p:cNvGraphicFramePr>
+            <p:nvPr/>
+          </p:nvGraphicFramePr>
+          <p:xfrm>
+            <a:off x="2870020" y="2865604"/>
+            <a:ext cx="1520825" cy="631825"/>
+          </p:xfrm>
+          <a:graphic>
+            <a:graphicData uri="http://schemas.openxmlformats.org/presentationml/2006/ole">
+              <p:oleObj spid="_x0000_s2056" name="Formel" r:id="rId4" imgW="1104840" imgH="457200" progId="Equation.3">
+                <p:embed/>
+              </p:oleObj>
+            </a:graphicData>
+          </a:graphic>
+        </p:graphicFrame>
+        <p:graphicFrame>
+          <p:nvGraphicFramePr>
+            <p:cNvPr id="1033" name="Object 9"/>
+            <p:cNvGraphicFramePr>
+              <a:graphicFrameLocks noChangeAspect="1"/>
+            </p:cNvGraphicFramePr>
+            <p:nvPr/>
+          </p:nvGraphicFramePr>
+          <p:xfrm>
+            <a:off x="6275417" y="2353799"/>
+            <a:ext cx="768350" cy="280988"/>
+          </p:xfrm>
+          <a:graphic>
+            <a:graphicData uri="http://schemas.openxmlformats.org/presentationml/2006/ole">
+              <p:oleObj spid="_x0000_s2057" name="Formel" r:id="rId5" imgW="558720" imgH="203040" progId="Equation.3">
+                <p:embed/>
+              </p:oleObj>
+            </a:graphicData>
+          </a:graphic>
+        </p:graphicFrame>
+        <p:sp>
+          <p:nvSpPr>
+            <p:cNvPr id="19" name="Rechteck 18"/>
+            <p:cNvSpPr/>
+            <p:nvPr/>
+          </p:nvSpPr>
+          <p:spPr>
+            <a:xfrm>
+              <a:off x="2870020" y="2865603"/>
+              <a:ext cx="1520825" cy="631825"/>
+            </a:xfrm>
+            <a:prstGeom prst="rect">
+              <a:avLst/>
+            </a:prstGeom>
+            <a:noFill/>
+            <a:ln/>
+          </p:spPr>
+          <p:style>
+            <a:lnRef idx="2">
+              <a:schemeClr val="accent4"/>
+            </a:lnRef>
+            <a:fillRef idx="1">
+              <a:schemeClr val="lt1"/>
+            </a:fillRef>
+            <a:effectRef idx="0">
+              <a:schemeClr val="accent4"/>
+            </a:effectRef>
+            <a:fontRef idx="minor">
+              <a:schemeClr val="dk1"/>
+            </a:fontRef>
+          </p:style>
+          <p:txBody>
+            <a:bodyPr rtlCol="0" anchor="ctr"/>
+            <a:lstStyle/>
+            <a:p>
+              <a:pPr algn="ctr"/>
+              <a:endParaRPr lang="de-CH"/>
+            </a:p>
+          </p:txBody>
+        </p:sp>
+        <p:sp>
+          <p:nvSpPr>
+            <p:cNvPr id="20" name="Rechteck 19"/>
+            <p:cNvSpPr/>
+            <p:nvPr/>
+          </p:nvSpPr>
+          <p:spPr>
+            <a:xfrm>
+              <a:off x="6798038" y="2865604"/>
+              <a:ext cx="1520825" cy="631825"/>
+            </a:xfrm>
+            <a:prstGeom prst="rect">
+              <a:avLst/>
+            </a:prstGeom>
+            <a:noFill/>
+            <a:ln/>
+          </p:spPr>
+          <p:style>
+            <a:lnRef idx="2">
+              <a:schemeClr val="accent4"/>
+            </a:lnRef>
+            <a:fillRef idx="1">
+              <a:schemeClr val="lt1"/>
+            </a:fillRef>
+            <a:effectRef idx="0">
+              <a:schemeClr val="accent4"/>
+            </a:effectRef>
+            <a:fontRef idx="minor">
+              <a:schemeClr val="dk1"/>
+            </a:fontRef>
+          </p:style>
+          <p:txBody>
+            <a:bodyPr rtlCol="0" anchor="ctr"/>
+            <a:lstStyle/>
+            <a:p>
+              <a:pPr algn="ctr"/>
+              <a:endParaRPr lang="de-CH"/>
+            </a:p>
+          </p:txBody>
+        </p:sp>
+        <p:graphicFrame>
+          <p:nvGraphicFramePr>
+            <p:cNvPr id="1034" name="Object 10"/>
+            <p:cNvGraphicFramePr>
+              <a:graphicFrameLocks noChangeAspect="1"/>
+            </p:cNvGraphicFramePr>
+            <p:nvPr/>
+          </p:nvGraphicFramePr>
+          <p:xfrm>
+            <a:off x="2157922" y="2634787"/>
+            <a:ext cx="558800" cy="351886"/>
+          </p:xfrm>
+          <a:graphic>
+            <a:graphicData uri="http://schemas.openxmlformats.org/presentationml/2006/ole">
+              <p:oleObj spid="_x0000_s2058" name="Formel" r:id="rId6" imgW="406080" imgH="253800" progId="Equation.3">
+                <p:embed/>
+              </p:oleObj>
+            </a:graphicData>
+          </a:graphic>
+        </p:graphicFrame>
+      </p:grpSp>
+      <p:pic>
+        <p:nvPicPr>
+          <p:cNvPr id="2059" name="Picture 11" descr="C:\Users\Matthias\Desktop\residual_contour_quaternions.png"/>
+          <p:cNvPicPr>
+            <a:picLocks noChangeAspect="1" noChangeArrowheads="1"/>
+          </p:cNvPicPr>
+          <p:nvPr/>
+        </p:nvPicPr>
+        <p:blipFill>
+          <a:blip r:embed="rId7"/>
+          <a:srcRect/>
+          <a:stretch>
+            <a:fillRect/>
+          </a:stretch>
+        </p:blipFill>
+        <p:spPr bwMode="auto">
+          <a:xfrm>
+            <a:off x="845389" y="3578388"/>
+            <a:ext cx="3170769" cy="2373838"/>
+          </a:xfrm>
+          <a:prstGeom prst="rect">
+            <a:avLst/>
+          </a:prstGeom>
+          <a:noFill/>
+        </p:spPr>
+      </p:pic>
+      <p:pic>
+        <p:nvPicPr>
+          <p:cNvPr id="2060" name="Picture 12" descr="C:\Users\Matthias\Desktop\residual_contour.png"/>
+          <p:cNvPicPr>
+            <a:picLocks noChangeAspect="1" noChangeArrowheads="1"/>
+          </p:cNvPicPr>
+          <p:nvPr/>
+        </p:nvPicPr>
+        <p:blipFill>
+          <a:blip r:embed="rId8"/>
+          <a:srcRect/>
+          <a:stretch>
+            <a:fillRect/>
+          </a:stretch>
+        </p:blipFill>
+        <p:spPr bwMode="auto">
+          <a:xfrm>
+            <a:off x="4948451" y="3635956"/>
+            <a:ext cx="3370413" cy="2523304"/>
+          </a:xfrm>
+          <a:prstGeom prst="rect">
+            <a:avLst/>
+          </a:prstGeom>
+          <a:noFill/>
+        </p:spPr>
+      </p:pic>
     </p:spTree>
-    <p:extLst>
-      <p:ext uri="{BB962C8B-B14F-4D97-AF65-F5344CB8AC3E}">
-        <p14:creationId xmlns:p14="http://schemas.microsoft.com/office/powerpoint/2010/main" xmlns="" val="3848908526"/>
-      </p:ext>
-    </p:extLst>
   </p:cSld>
   <p:clrMapOvr>
     <a:masterClrMapping/>
@@ -4686,6 +5742,13 @@
   <p:transition>
     <p:fade/>
   </p:transition>
+  <p:timing>
+    <p:tnLst>
+      <p:par>
+        <p:cTn id="1" dur="indefinite" restart="never" nodeType="tmRoot"/>
+      </p:par>
+    </p:tnLst>
+  </p:timing>
 </p:sld>
 </file>
 
@@ -4721,7 +5784,11 @@
           <a:bodyPr/>
           <a:lstStyle/>
           <a:p>
-            <a:endParaRPr lang="de-CH"/>
+            <a:r>
+              <a:rPr lang="de-CH" dirty="0" smtClean="0"/>
+              <a:t>Video?</a:t>
+            </a:r>
+            <a:endParaRPr lang="de-CH" dirty="0"/>
           </a:p>
         </p:txBody>
       </p:sp>
@@ -4743,7 +5810,7 @@
             <a:fld id="{3B2F6CB8-9391-4BED-909F-C47A979AE1C4}" type="datetime1">
               <a:rPr lang="de-DE" smtClean="0"/>
               <a:pPr/>
-              <a:t>17.04.2014</a:t>
+              <a:t>19.04.2014</a:t>
             </a:fld>
             <a:endParaRPr lang="de-DE"/>
           </a:p>
@@ -4766,9 +5833,9 @@
           <a:p>
             <a:r>
               <a:rPr lang="de-DE" smtClean="0"/>
-              <a:t>((Vorname Nachname))</a:t>
-            </a:r>
-            <a:endParaRPr lang="de-DE"/>
+              <a:t>Matthias Krebs, Simon Laube</a:t>
+            </a:r>
+            <a:endParaRPr lang="de-DE" dirty="0"/>
           </a:p>
         </p:txBody>
       </p:sp>
@@ -4811,16 +5878,15 @@
           <a:bodyPr/>
           <a:lstStyle/>
           <a:p>
-            <a:endParaRPr lang="de-CH"/>
+            <a:r>
+              <a:rPr lang="de-CH" dirty="0" err="1" smtClean="0"/>
+              <a:t>Example</a:t>
+            </a:r>
+            <a:endParaRPr lang="de-CH" dirty="0"/>
           </a:p>
         </p:txBody>
       </p:sp>
     </p:spTree>
-    <p:extLst>
-      <p:ext uri="{BB962C8B-B14F-4D97-AF65-F5344CB8AC3E}">
-        <p14:creationId xmlns:p14="http://schemas.microsoft.com/office/powerpoint/2010/main" xmlns="" val="2470698625"/>
-      </p:ext>
-    </p:extLst>
   </p:cSld>
   <p:clrMapOvr>
     <a:masterClrMapping/>
@@ -4828,6 +5894,13 @@
   <p:transition>
     <p:fade/>
   </p:transition>
+  <p:timing>
+    <p:tnLst>
+      <p:par>
+        <p:cTn id="1" dur="indefinite" restart="never" nodeType="tmRoot"/>
+      </p:par>
+    </p:tnLst>
+  </p:timing>
 </p:sld>
 </file>
 
@@ -4855,7 +5928,7 @@
             <a:spLocks noGrp="1"/>
           </p:cNvSpPr>
           <p:nvPr>
-            <p:ph sz="half" idx="1"/>
+            <p:ph idx="1"/>
           </p:nvPr>
         </p:nvSpPr>
         <p:spPr/>
@@ -4863,18 +5936,86 @@
           <a:bodyPr/>
           <a:lstStyle/>
           <a:p>
-            <a:endParaRPr lang="de-CH"/>
-          </a:p>
-        </p:txBody>
-      </p:sp>
-      <p:sp>
-        <p:nvSpPr>
-          <p:cNvPr id="3" name="Inhaltsplatzhalter 2"/>
-          <p:cNvSpPr>
-            <a:spLocks noGrp="1"/>
-          </p:cNvSpPr>
-          <p:nvPr>
-            <p:ph sz="half" idx="2"/>
+            <a:r>
+              <a:rPr lang="de-CH" dirty="0" smtClean="0"/>
+              <a:t>Inputs </a:t>
+            </a:r>
+            <a:r>
+              <a:rPr lang="de-CH" dirty="0" err="1" smtClean="0"/>
+              <a:t>bla</a:t>
+            </a:r>
+            <a:r>
+              <a:rPr lang="de-CH" dirty="0" smtClean="0"/>
+              <a:t> </a:t>
+            </a:r>
+            <a:r>
+              <a:rPr lang="de-CH" dirty="0" err="1" smtClean="0"/>
+              <a:t>bla</a:t>
+            </a:r>
+            <a:r>
+              <a:rPr lang="de-CH" dirty="0" smtClean="0"/>
+              <a:t> …</a:t>
+            </a:r>
+          </a:p>
+          <a:p>
+            <a:r>
+              <a:rPr lang="de-CH" dirty="0" smtClean="0"/>
+              <a:t>Text </a:t>
+            </a:r>
+            <a:r>
+              <a:rPr lang="de-CH" dirty="0" err="1" smtClean="0"/>
+              <a:t>Cases</a:t>
+            </a:r>
+            <a:r>
+              <a:rPr lang="de-CH" dirty="0" smtClean="0"/>
+              <a:t> …</a:t>
+            </a:r>
+          </a:p>
+          <a:p>
+            <a:r>
+              <a:rPr lang="de-CH" dirty="0" err="1" smtClean="0"/>
+              <a:t>Estimate</a:t>
+            </a:r>
+            <a:r>
+              <a:rPr lang="de-CH" dirty="0" smtClean="0"/>
+              <a:t> </a:t>
+            </a:r>
+            <a:r>
+              <a:rPr lang="de-CH" dirty="0" err="1" smtClean="0"/>
+              <a:t>Accuracy</a:t>
+            </a:r>
+            <a:r>
+              <a:rPr lang="de-CH" dirty="0" smtClean="0"/>
+              <a:t> </a:t>
+            </a:r>
+            <a:r>
+              <a:rPr lang="de-CH" dirty="0" err="1" smtClean="0"/>
+              <a:t>of</a:t>
+            </a:r>
+            <a:r>
+              <a:rPr lang="de-CH" dirty="0" smtClean="0"/>
+              <a:t> </a:t>
+            </a:r>
+            <a:r>
+              <a:rPr lang="de-CH" dirty="0" err="1" smtClean="0"/>
+              <a:t>Result</a:t>
+            </a:r>
+            <a:r>
+              <a:rPr lang="de-CH" dirty="0" smtClean="0"/>
+              <a:t> ...</a:t>
+            </a:r>
+            <a:endParaRPr lang="de-CH" dirty="0"/>
+          </a:p>
+        </p:txBody>
+      </p:sp>
+      <p:sp>
+        <p:nvSpPr>
+          <p:cNvPr id="3" name="Datumsplatzhalter 2"/>
+          <p:cNvSpPr>
+            <a:spLocks noGrp="1"/>
+          </p:cNvSpPr>
+          <p:nvPr>
+            <p:ph type="dt" sz="half" idx="10"/>
           </p:nvPr>
         </p:nvSpPr>
         <p:spPr/>
@@ -4882,29 +6023,10 @@
           <a:bodyPr/>
           <a:lstStyle/>
           <a:p>
-            <a:endParaRPr lang="de-CH"/>
-          </a:p>
-        </p:txBody>
-      </p:sp>
-      <p:sp>
-        <p:nvSpPr>
-          <p:cNvPr id="4" name="Datumsplatzhalter 3"/>
-          <p:cNvSpPr>
-            <a:spLocks noGrp="1"/>
-          </p:cNvSpPr>
-          <p:nvPr>
-            <p:ph type="dt" sz="half" idx="10"/>
-          </p:nvPr>
-        </p:nvSpPr>
-        <p:spPr/>
-        <p:txBody>
-          <a:bodyPr/>
-          <a:lstStyle/>
-          <a:p>
-            <a:fld id="{C6A1628A-2A40-4B37-B167-309C0EBB4BBF}" type="datetime1">
+            <a:fld id="{3B2F6CB8-9391-4BED-909F-C47A979AE1C4}" type="datetime1">
               <a:rPr lang="de-DE" smtClean="0"/>
               <a:pPr/>
-              <a:t>17.04.2014</a:t>
+              <a:t>19.04.2014</a:t>
             </a:fld>
             <a:endParaRPr lang="de-DE"/>
           </a:p>
@@ -4912,7 +6034,7 @@
       </p:sp>
       <p:sp>
         <p:nvSpPr>
-          <p:cNvPr id="5" name="Fußzeilenplatzhalter 4"/>
+          <p:cNvPr id="4" name="Fußzeilenplatzhalter 3"/>
           <p:cNvSpPr>
             <a:spLocks noGrp="1"/>
           </p:cNvSpPr>
@@ -4927,15 +6049,15 @@
           <a:p>
             <a:r>
               <a:rPr lang="de-DE" smtClean="0"/>
-              <a:t>((Vorname Nachname))</a:t>
-            </a:r>
-            <a:endParaRPr lang="de-DE"/>
-          </a:p>
-        </p:txBody>
-      </p:sp>
-      <p:sp>
-        <p:nvSpPr>
-          <p:cNvPr id="6" name="Foliennummernplatzhalter 5"/>
+              <a:t>Matthias Krebs, Simon Laube</a:t>
+            </a:r>
+            <a:endParaRPr lang="de-DE" dirty="0"/>
+          </a:p>
+        </p:txBody>
+      </p:sp>
+      <p:sp>
+        <p:nvSpPr>
+          <p:cNvPr id="5" name="Foliennummernplatzhalter 4"/>
           <p:cNvSpPr>
             <a:spLocks noGrp="1"/>
           </p:cNvSpPr>
@@ -4959,7 +6081,7 @@
       </p:sp>
       <p:sp>
         <p:nvSpPr>
-          <p:cNvPr id="7" name="Titel 6"/>
+          <p:cNvPr id="6" name="Titel 5"/>
           <p:cNvSpPr>
             <a:spLocks noGrp="1"/>
           </p:cNvSpPr>
@@ -4972,16 +6094,15 @@
           <a:bodyPr/>
           <a:lstStyle/>
           <a:p>
-            <a:endParaRPr lang="de-CH"/>
+            <a:r>
+              <a:rPr lang="de-CH" dirty="0" smtClean="0"/>
+              <a:t>Outlook</a:t>
+            </a:r>
+            <a:endParaRPr lang="de-CH" dirty="0"/>
           </a:p>
         </p:txBody>
       </p:sp>
     </p:spTree>
-    <p:extLst>
-      <p:ext uri="{BB962C8B-B14F-4D97-AF65-F5344CB8AC3E}">
-        <p14:creationId xmlns:p14="http://schemas.microsoft.com/office/powerpoint/2010/main" xmlns="" val="2413663294"/>
-      </p:ext>
-    </p:extLst>
   </p:cSld>
   <p:clrMapOvr>
     <a:masterClrMapping/>
@@ -4989,387 +6110,13 @@
   <p:transition>
     <p:fade/>
   </p:transition>
-</p:sld>
-</file>
-
-<file path=ppt/slides/slide7.xml><?xml version="1.0" encoding="utf-8"?>
-<p:sld xmlns:a="http://schemas.openxmlformats.org/drawingml/2006/main" xmlns:r="http://schemas.openxmlformats.org/officeDocument/2006/relationships" xmlns:p="http://schemas.openxmlformats.org/presentationml/2006/main">
-  <p:cSld>
-    <p:spTree>
-      <p:nvGrpSpPr>
-        <p:cNvPr id="1" name=""/>
-        <p:cNvGrpSpPr/>
-        <p:nvPr/>
-      </p:nvGrpSpPr>
-      <p:grpSpPr>
-        <a:xfrm>
-          <a:off x="0" y="0"/>
-          <a:ext cx="0" cy="0"/>
-          <a:chOff x="0" y="0"/>
-          <a:chExt cx="0" cy="0"/>
-        </a:xfrm>
-      </p:grpSpPr>
-      <p:sp>
-        <p:nvSpPr>
-          <p:cNvPr id="2" name="Datumsplatzhalter 1"/>
-          <p:cNvSpPr>
-            <a:spLocks noGrp="1"/>
-          </p:cNvSpPr>
-          <p:nvPr>
-            <p:ph type="dt" sz="half" idx="10"/>
-          </p:nvPr>
-        </p:nvSpPr>
-        <p:spPr/>
-        <p:txBody>
-          <a:bodyPr/>
-          <a:lstStyle/>
-          <a:p>
-            <a:fld id="{64AE1E89-2EE0-4320-B5A2-F15E505D5862}" type="datetime1">
-              <a:rPr lang="de-DE" smtClean="0"/>
-              <a:pPr/>
-              <a:t>17.04.2014</a:t>
-            </a:fld>
-            <a:endParaRPr lang="de-DE"/>
-          </a:p>
-        </p:txBody>
-      </p:sp>
-      <p:sp>
-        <p:nvSpPr>
-          <p:cNvPr id="3" name="Fußzeilenplatzhalter 2"/>
-          <p:cNvSpPr>
-            <a:spLocks noGrp="1"/>
-          </p:cNvSpPr>
-          <p:nvPr>
-            <p:ph type="ftr" sz="quarter" idx="11"/>
-          </p:nvPr>
-        </p:nvSpPr>
-        <p:spPr/>
-        <p:txBody>
-          <a:bodyPr/>
-          <a:lstStyle/>
-          <a:p>
-            <a:r>
-              <a:rPr lang="de-DE" smtClean="0"/>
-              <a:t>((Vorname Nachname))</a:t>
-            </a:r>
-            <a:endParaRPr lang="de-DE"/>
-          </a:p>
-        </p:txBody>
-      </p:sp>
-      <p:sp>
-        <p:nvSpPr>
-          <p:cNvPr id="4" name="Foliennummernplatzhalter 3"/>
-          <p:cNvSpPr>
-            <a:spLocks noGrp="1"/>
-          </p:cNvSpPr>
-          <p:nvPr>
-            <p:ph type="sldNum" sz="quarter" idx="12"/>
-          </p:nvPr>
-        </p:nvSpPr>
-        <p:spPr/>
-        <p:txBody>
-          <a:bodyPr/>
-          <a:lstStyle/>
-          <a:p>
-            <a:fld id="{6C6AE60A-B69C-4790-82F7-3882EDF23186}" type="slidenum">
-              <a:rPr lang="de-DE" smtClean="0"/>
-              <a:pPr/>
-              <a:t>7</a:t>
-            </a:fld>
-            <a:endParaRPr lang="de-DE"/>
-          </a:p>
-        </p:txBody>
-      </p:sp>
-      <p:sp>
-        <p:nvSpPr>
-          <p:cNvPr id="5" name="Titel 4"/>
-          <p:cNvSpPr>
-            <a:spLocks noGrp="1"/>
-          </p:cNvSpPr>
-          <p:nvPr>
-            <p:ph type="title"/>
-          </p:nvPr>
-        </p:nvSpPr>
-        <p:spPr/>
-        <p:txBody>
-          <a:bodyPr/>
-          <a:lstStyle/>
-          <a:p>
-            <a:endParaRPr lang="de-CH"/>
-          </a:p>
-        </p:txBody>
-      </p:sp>
-    </p:spTree>
-    <p:extLst>
-      <p:ext uri="{BB962C8B-B14F-4D97-AF65-F5344CB8AC3E}">
-        <p14:creationId xmlns:p14="http://schemas.microsoft.com/office/powerpoint/2010/main" xmlns="" val="34058075"/>
-      </p:ext>
-    </p:extLst>
-  </p:cSld>
-  <p:clrMapOvr>
-    <a:masterClrMapping/>
-  </p:clrMapOvr>
-  <p:transition>
-    <p:fade/>
-  </p:transition>
-</p:sld>
-</file>
-
-<file path=ppt/slides/slide8.xml><?xml version="1.0" encoding="utf-8"?>
-<p:sld xmlns:a="http://schemas.openxmlformats.org/drawingml/2006/main" xmlns:r="http://schemas.openxmlformats.org/officeDocument/2006/relationships" xmlns:p="http://schemas.openxmlformats.org/presentationml/2006/main">
-  <p:cSld>
-    <p:spTree>
-      <p:nvGrpSpPr>
-        <p:cNvPr id="1" name=""/>
-        <p:cNvGrpSpPr/>
-        <p:nvPr/>
-      </p:nvGrpSpPr>
-      <p:grpSpPr>
-        <a:xfrm>
-          <a:off x="0" y="0"/>
-          <a:ext cx="0" cy="0"/>
-          <a:chOff x="0" y="0"/>
-          <a:chExt cx="0" cy="0"/>
-        </a:xfrm>
-      </p:grpSpPr>
-      <p:sp>
-        <p:nvSpPr>
-          <p:cNvPr id="2" name="Datumsplatzhalter 1"/>
-          <p:cNvSpPr>
-            <a:spLocks noGrp="1"/>
-          </p:cNvSpPr>
-          <p:nvPr>
-            <p:ph type="dt" sz="half" idx="10"/>
-          </p:nvPr>
-        </p:nvSpPr>
-        <p:spPr/>
-        <p:txBody>
-          <a:bodyPr/>
-          <a:lstStyle/>
-          <a:p>
-            <a:fld id="{7D860B62-60FD-48EF-B2F4-6E7265AD3459}" type="datetime1">
-              <a:rPr lang="de-DE" smtClean="0"/>
-              <a:pPr/>
-              <a:t>17.04.2014</a:t>
-            </a:fld>
-            <a:endParaRPr lang="de-DE"/>
-          </a:p>
-        </p:txBody>
-      </p:sp>
-      <p:sp>
-        <p:nvSpPr>
-          <p:cNvPr id="3" name="Fußzeilenplatzhalter 2"/>
-          <p:cNvSpPr>
-            <a:spLocks noGrp="1"/>
-          </p:cNvSpPr>
-          <p:nvPr>
-            <p:ph type="ftr" sz="quarter" idx="11"/>
-          </p:nvPr>
-        </p:nvSpPr>
-        <p:spPr/>
-        <p:txBody>
-          <a:bodyPr/>
-          <a:lstStyle/>
-          <a:p>
-            <a:r>
-              <a:rPr lang="de-DE" smtClean="0"/>
-              <a:t>((Vorname Nachname))</a:t>
-            </a:r>
-            <a:endParaRPr lang="de-DE"/>
-          </a:p>
-        </p:txBody>
-      </p:sp>
-      <p:sp>
-        <p:nvSpPr>
-          <p:cNvPr id="4" name="Foliennummernplatzhalter 3"/>
-          <p:cNvSpPr>
-            <a:spLocks noGrp="1"/>
-          </p:cNvSpPr>
-          <p:nvPr>
-            <p:ph type="sldNum" sz="quarter" idx="12"/>
-          </p:nvPr>
-        </p:nvSpPr>
-        <p:spPr/>
-        <p:txBody>
-          <a:bodyPr/>
-          <a:lstStyle/>
-          <a:p>
-            <a:fld id="{6C6AE60A-B69C-4790-82F7-3882EDF23186}" type="slidenum">
-              <a:rPr lang="de-DE" smtClean="0"/>
-              <a:pPr/>
-              <a:t>8</a:t>
-            </a:fld>
-            <a:endParaRPr lang="de-DE"/>
-          </a:p>
-        </p:txBody>
-      </p:sp>
-      <p:sp>
-        <p:nvSpPr>
-          <p:cNvPr id="5" name="Bildplatzhalter 4"/>
-          <p:cNvSpPr>
-            <a:spLocks noGrp="1"/>
-          </p:cNvSpPr>
-          <p:nvPr>
-            <p:ph type="pic" sz="quarter" idx="13"/>
-          </p:nvPr>
-        </p:nvSpPr>
-        <p:spPr/>
-      </p:sp>
-    </p:spTree>
-    <p:extLst>
-      <p:ext uri="{BB962C8B-B14F-4D97-AF65-F5344CB8AC3E}">
-        <p14:creationId xmlns:p14="http://schemas.microsoft.com/office/powerpoint/2010/main" xmlns="" val="3942276668"/>
-      </p:ext>
-    </p:extLst>
-  </p:cSld>
-  <p:clrMapOvr>
-    <a:masterClrMapping/>
-  </p:clrMapOvr>
-  <p:transition>
-    <p:fade/>
-  </p:transition>
-</p:sld>
-</file>
-
-<file path=ppt/slides/slide9.xml><?xml version="1.0" encoding="utf-8"?>
-<p:sld xmlns:a="http://schemas.openxmlformats.org/drawingml/2006/main" xmlns:r="http://schemas.openxmlformats.org/officeDocument/2006/relationships" xmlns:p="http://schemas.openxmlformats.org/presentationml/2006/main">
-  <p:cSld>
-    <p:spTree>
-      <p:nvGrpSpPr>
-        <p:cNvPr id="1" name=""/>
-        <p:cNvGrpSpPr/>
-        <p:nvPr/>
-      </p:nvGrpSpPr>
-      <p:grpSpPr>
-        <a:xfrm>
-          <a:off x="0" y="0"/>
-          <a:ext cx="0" cy="0"/>
-          <a:chOff x="0" y="0"/>
-          <a:chExt cx="0" cy="0"/>
-        </a:xfrm>
-      </p:grpSpPr>
-      <p:sp>
-        <p:nvSpPr>
-          <p:cNvPr id="2" name="Datumsplatzhalter 1"/>
-          <p:cNvSpPr>
-            <a:spLocks noGrp="1"/>
-          </p:cNvSpPr>
-          <p:nvPr>
-            <p:ph type="dt" sz="half" idx="10"/>
-          </p:nvPr>
-        </p:nvSpPr>
-        <p:spPr/>
-        <p:txBody>
-          <a:bodyPr/>
-          <a:lstStyle/>
-          <a:p>
-            <a:fld id="{7F4A91D9-FBFE-4ACC-A99A-BC74A6E03CC5}" type="datetime1">
-              <a:rPr lang="de-DE" smtClean="0"/>
-              <a:pPr/>
-              <a:t>17.04.2014</a:t>
-            </a:fld>
-            <a:endParaRPr lang="de-DE"/>
-          </a:p>
-        </p:txBody>
-      </p:sp>
-      <p:sp>
-        <p:nvSpPr>
-          <p:cNvPr id="3" name="Fußzeilenplatzhalter 2"/>
-          <p:cNvSpPr>
-            <a:spLocks noGrp="1"/>
-          </p:cNvSpPr>
-          <p:nvPr>
-            <p:ph type="ftr" sz="quarter" idx="11"/>
-          </p:nvPr>
-        </p:nvSpPr>
-        <p:spPr/>
-        <p:txBody>
-          <a:bodyPr/>
-          <a:lstStyle/>
-          <a:p>
-            <a:r>
-              <a:rPr lang="de-DE" smtClean="0"/>
-              <a:t>((Vorname Nachname))</a:t>
-            </a:r>
-            <a:endParaRPr lang="de-DE"/>
-          </a:p>
-        </p:txBody>
-      </p:sp>
-      <p:sp>
-        <p:nvSpPr>
-          <p:cNvPr id="4" name="Foliennummernplatzhalter 3"/>
-          <p:cNvSpPr>
-            <a:spLocks noGrp="1"/>
-          </p:cNvSpPr>
-          <p:nvPr>
-            <p:ph type="sldNum" sz="quarter" idx="12"/>
-          </p:nvPr>
-        </p:nvSpPr>
-        <p:spPr/>
-        <p:txBody>
-          <a:bodyPr/>
-          <a:lstStyle/>
-          <a:p>
-            <a:fld id="{6C6AE60A-B69C-4790-82F7-3882EDF23186}" type="slidenum">
-              <a:rPr lang="de-DE" smtClean="0"/>
-              <a:pPr/>
-              <a:t>9</a:t>
-            </a:fld>
-            <a:endParaRPr lang="de-DE"/>
-          </a:p>
-        </p:txBody>
-      </p:sp>
-      <p:sp>
-        <p:nvSpPr>
-          <p:cNvPr id="5" name="Inhaltsplatzhalter 4"/>
-          <p:cNvSpPr>
-            <a:spLocks noGrp="1"/>
-          </p:cNvSpPr>
-          <p:nvPr>
-            <p:ph sz="quarter" idx="13"/>
-          </p:nvPr>
-        </p:nvSpPr>
-        <p:spPr/>
-        <p:txBody>
-          <a:bodyPr/>
-          <a:lstStyle/>
-          <a:p>
-            <a:endParaRPr lang="de-CH"/>
-          </a:p>
-        </p:txBody>
-      </p:sp>
-      <p:sp>
-        <p:nvSpPr>
-          <p:cNvPr id="6" name="Titel 5"/>
-          <p:cNvSpPr>
-            <a:spLocks noGrp="1"/>
-          </p:cNvSpPr>
-          <p:nvPr>
-            <p:ph type="title"/>
-          </p:nvPr>
-        </p:nvSpPr>
-        <p:spPr/>
-        <p:txBody>
-          <a:bodyPr/>
-          <a:lstStyle/>
-          <a:p>
-            <a:endParaRPr lang="de-CH"/>
-          </a:p>
-        </p:txBody>
-      </p:sp>
-    </p:spTree>
-    <p:extLst>
-      <p:ext uri="{BB962C8B-B14F-4D97-AF65-F5344CB8AC3E}">
-        <p14:creationId xmlns:p14="http://schemas.microsoft.com/office/powerpoint/2010/main" xmlns="" val="1021420575"/>
-      </p:ext>
-    </p:extLst>
-  </p:cSld>
-  <p:clrMapOvr>
-    <a:masterClrMapping/>
-  </p:clrMapOvr>
-  <p:transition>
-    <p:fade/>
-  </p:transition>
+  <p:timing>
+    <p:tnLst>
+      <p:par>
+        <p:cTn id="1" dur="indefinite" restart="never" nodeType="tmRoot"/>
+      </p:par>
+    </p:tnLst>
+  </p:timing>
 </p:sld>
 </file>
 

</xml_diff>

<commit_message>
[presentation] small minor change (only small one)
</commit_message>
<xml_diff>
--- a/02_Presentation/0201_Intermediate/Intermediate_Semesterthesis_v0.pptx
+++ b/02_Presentation/0201_Intermediate/Intermediate_Semesterthesis_v0.pptx
@@ -4067,8 +4067,39 @@
                 <a:ea typeface="+mn-ea"/>
                 <a:cs typeface="+mn-cs"/>
               </a:rPr>
-              <a:t>:	Alexis Kostas</a:t>
-            </a:r>
+              <a:t>:	</a:t>
+            </a:r>
+            <a:r>
+              <a:rPr kumimoji="0" lang="de-CH" sz="1800" b="0" i="0" u="none" strike="noStrike" kern="1200" cap="none" spc="0" normalizeH="0" noProof="0" dirty="0" smtClean="0">
+                <a:ln>
+                  <a:noFill/>
+                </a:ln>
+                <a:solidFill>
+                  <a:schemeClr val="bg1"/>
+                </a:solidFill>
+                <a:effectLst/>
+                <a:uLnTx/>
+                <a:uFillTx/>
+                <a:latin typeface="+mn-lt"/>
+                <a:ea typeface="+mn-ea"/>
+                <a:cs typeface="+mn-cs"/>
+              </a:rPr>
+              <a:t>Kostas Alexis</a:t>
+            </a:r>
+            <a:endParaRPr kumimoji="0" lang="de-CH" sz="1800" b="0" i="0" u="none" strike="noStrike" kern="1200" cap="none" spc="0" normalizeH="0" noProof="0" dirty="0" smtClean="0">
+              <a:ln>
+                <a:noFill/>
+              </a:ln>
+              <a:solidFill>
+                <a:schemeClr val="bg1"/>
+              </a:solidFill>
+              <a:effectLst/>
+              <a:uLnTx/>
+              <a:uFillTx/>
+              <a:latin typeface="+mn-lt"/>
+              <a:ea typeface="+mn-ea"/>
+              <a:cs typeface="+mn-cs"/>
+            </a:endParaRPr>
           </a:p>
           <a:p>
             <a:pPr marL="0" marR="0" lvl="0" indent="0" algn="l" defTabSz="914400" rtl="0" eaLnBrk="1" fontAlgn="auto" latinLnBrk="0" hangingPunct="1">

</xml_diff>